<commit_message>
kickoff präsi inklusive kommentare von clmb
</commit_message>
<xml_diff>
--- a/KickOff-Praesentation/vorlage.pptx
+++ b/KickOff-Praesentation/vorlage.pptx
@@ -5,7 +5,7 @@
     <p:sldMasterId id="2147483648" r:id="rId1"/>
   </p:sldMasterIdLst>
   <p:notesMasterIdLst>
-    <p:notesMasterId r:id="rId20"/>
+    <p:notesMasterId r:id="rId21"/>
   </p:notesMasterIdLst>
   <p:sldIdLst>
     <p:sldId id="256" r:id="rId2"/>
@@ -18,14 +18,15 @@
     <p:sldId id="265" r:id="rId9"/>
     <p:sldId id="271" r:id="rId10"/>
     <p:sldId id="266" r:id="rId11"/>
-    <p:sldId id="268" r:id="rId12"/>
-    <p:sldId id="273" r:id="rId13"/>
-    <p:sldId id="269" r:id="rId14"/>
-    <p:sldId id="270" r:id="rId15"/>
-    <p:sldId id="259" r:id="rId16"/>
-    <p:sldId id="263" r:id="rId17"/>
-    <p:sldId id="267" r:id="rId18"/>
-    <p:sldId id="272" r:id="rId19"/>
+    <p:sldId id="274" r:id="rId12"/>
+    <p:sldId id="268" r:id="rId13"/>
+    <p:sldId id="273" r:id="rId14"/>
+    <p:sldId id="269" r:id="rId15"/>
+    <p:sldId id="270" r:id="rId16"/>
+    <p:sldId id="259" r:id="rId17"/>
+    <p:sldId id="263" r:id="rId18"/>
+    <p:sldId id="267" r:id="rId19"/>
+    <p:sldId id="272" r:id="rId20"/>
   </p:sldIdLst>
   <p:sldSz cx="9144000" cy="6858000" type="screen4x3"/>
   <p:notesSz cx="6858000" cy="9144000"/>
@@ -210,7 +211,7 @@
             <a:fld id="{3AF138D4-E06A-4D92-B176-75A0C7906805}" type="datetimeFigureOut">
               <a:rPr lang="de-DE" smtClean="0"/>
               <a:pPr/>
-              <a:t>02.05.2012</a:t>
+              <a:t>03.05.2012</a:t>
             </a:fld>
             <a:endParaRPr lang="de-DE"/>
           </a:p>
@@ -3578,15 +3579,7 @@
           <a:p>
             <a:r>
               <a:rPr lang="de-DE" dirty="0" smtClean="0"/>
-              <a:t>Lösungsansätze für Applikationen zur Erleichterung des </a:t>
-            </a:r>
-            <a:r>
-              <a:rPr lang="de-DE" dirty="0" smtClean="0"/>
-              <a:t>intermodalen </a:t>
-            </a:r>
-            <a:r>
-              <a:rPr lang="de-DE" dirty="0" smtClean="0"/>
-              <a:t>Reisens bei der </a:t>
+              <a:t>Lösungsansätze für Applikationen zur Erleichterung des intermodalen Reisens bei der </a:t>
             </a:r>
             <a:r>
               <a:rPr lang="de-DE" dirty="0" err="1" smtClean="0"/>
@@ -3620,11 +3613,7 @@
           <a:p>
             <a:r>
               <a:rPr lang="de-DE" sz="2400" b="1" dirty="0" smtClean="0"/>
-              <a:t> – </a:t>
-            </a:r>
-            <a:r>
-              <a:rPr lang="de-DE" sz="2400" b="1" dirty="0" smtClean="0"/>
-              <a:t>Gruppe 1 – </a:t>
+              <a:t> – Gruppe 1 – </a:t>
             </a:r>
             <a:r>
               <a:rPr lang="de-DE" sz="2400" dirty="0" smtClean="0"/>
@@ -3635,11 +3624,7 @@
             </a:br>
             <a:r>
               <a:rPr lang="de-DE" sz="2400" i="1" dirty="0" smtClean="0"/>
-              <a:t>Tom </a:t>
-            </a:r>
-            <a:r>
-              <a:rPr lang="de-DE" sz="2400" i="1" dirty="0" smtClean="0"/>
-              <a:t>Bullmann, Andreas </a:t>
+              <a:t>Tom Bullmann, Andreas </a:t>
             </a:r>
             <a:r>
               <a:rPr lang="de-DE" sz="2400" i="1" dirty="0" err="1" smtClean="0"/>
@@ -3786,7 +3771,12 @@
             <p:ph idx="1"/>
           </p:nvPr>
         </p:nvSpPr>
-        <p:spPr/>
+        <p:spPr>
+          <a:xfrm>
+            <a:off x="457200" y="1124744"/>
+            <a:ext cx="8686800" cy="5001419"/>
+          </a:xfrm>
+        </p:spPr>
         <p:txBody>
           <a:bodyPr/>
           <a:lstStyle/>
@@ -3800,33 +3790,66 @@
             <a:pPr lvl="1"/>
             <a:r>
               <a:rPr lang="de-DE" dirty="0" smtClean="0"/>
-              <a:t>MS1: Paper </a:t>
+              <a:t>Zeitraum: 04.05 – 06.07.2012</a:t>
+            </a:r>
+            <a:endParaRPr lang="de-DE" dirty="0" smtClean="0"/>
+          </a:p>
+          <a:p>
+            <a:pPr lvl="2"/>
+            <a:r>
+              <a:rPr lang="de-DE" b="1" dirty="0" smtClean="0"/>
+              <a:t>MS1</a:t>
+            </a:r>
+            <a:r>
+              <a:rPr lang="de-DE" dirty="0" smtClean="0"/>
+              <a:t> (1 Woche, - 11.05): 	Paper </a:t>
             </a:r>
             <a:r>
               <a:rPr lang="de-DE" dirty="0" err="1" smtClean="0"/>
               <a:t>Prototyping</a:t>
             </a:r>
+            <a:r>
+              <a:rPr lang="de-DE" dirty="0" smtClean="0"/>
+              <a:t>	</a:t>
+            </a:r>
             <a:endParaRPr lang="de-DE" dirty="0" smtClean="0"/>
           </a:p>
           <a:p>
-            <a:pPr lvl="1"/>
+            <a:pPr lvl="2"/>
+            <a:r>
+              <a:rPr lang="de-DE" b="1" dirty="0" smtClean="0"/>
+              <a:t>MS2 </a:t>
+            </a:r>
             <a:r>
               <a:rPr lang="de-DE" dirty="0" smtClean="0"/>
-              <a:t>MS2: Webservice (Anmelden, Listen, etc.)</a:t>
-            </a:r>
-          </a:p>
-          <a:p>
-            <a:pPr lvl="1"/>
+              <a:t>(2 Wochen, - 25.05): 	Webservice </a:t>
+            </a:r>
             <a:r>
               <a:rPr lang="de-DE" dirty="0" smtClean="0"/>
-              <a:t>MS3: Taxierweiterung</a:t>
-            </a:r>
-          </a:p>
-          <a:p>
-            <a:pPr lvl="1"/>
+              <a:t>(Anmelden, Listen, etc.)</a:t>
+            </a:r>
+          </a:p>
+          <a:p>
+            <a:pPr lvl="2"/>
+            <a:r>
+              <a:rPr lang="de-DE" b="1" dirty="0" smtClean="0"/>
+              <a:t>MS3</a:t>
+            </a:r>
             <a:r>
               <a:rPr lang="de-DE" dirty="0" smtClean="0"/>
-              <a:t>MS4: Zugriff auf den Webservice per </a:t>
+              <a:t> (2 Wochen, - 08.06): 	Taxierweiterung</a:t>
+            </a:r>
+            <a:endParaRPr lang="de-DE" dirty="0" smtClean="0"/>
+          </a:p>
+          <a:p>
+            <a:pPr lvl="2"/>
+            <a:r>
+              <a:rPr lang="de-DE" b="1" dirty="0" smtClean="0"/>
+              <a:t>MS4</a:t>
+            </a:r>
+            <a:r>
+              <a:rPr lang="de-DE" dirty="0" smtClean="0"/>
+              <a:t> (2 Wochen, - 22.06):	Zugriff per </a:t>
             </a:r>
             <a:r>
               <a:rPr lang="de-DE" dirty="0" err="1" smtClean="0"/>
@@ -3838,10 +3861,18 @@
             </a:r>
           </a:p>
           <a:p>
-            <a:pPr lvl="1"/>
+            <a:pPr lvl="2"/>
+            <a:r>
+              <a:rPr lang="de-DE" b="1" dirty="0" smtClean="0"/>
+              <a:t>MS5</a:t>
+            </a:r>
             <a:r>
               <a:rPr lang="de-DE" dirty="0" smtClean="0"/>
-              <a:t>MS5: Optimierung &amp; Optionale Features</a:t>
+              <a:t> (2 Wochen, - 06.07):  	Optimierung </a:t>
+            </a:r>
+            <a:r>
+              <a:rPr lang="de-DE" dirty="0" smtClean="0"/>
+              <a:t>&amp; Optionale Features</a:t>
             </a:r>
           </a:p>
         </p:txBody>
@@ -3932,6 +3963,203 @@
 </file>
 
 <file path=ppt/slides/slide11.xml><?xml version="1.0" encoding="utf-8"?>
+<p:sld xmlns:a="http://schemas.openxmlformats.org/drawingml/2006/main" xmlns:r="http://schemas.openxmlformats.org/officeDocument/2006/relationships" xmlns:p="http://schemas.openxmlformats.org/presentationml/2006/main">
+  <p:cSld>
+    <p:spTree>
+      <p:nvGrpSpPr>
+        <p:cNvPr id="1" name=""/>
+        <p:cNvGrpSpPr/>
+        <p:nvPr/>
+      </p:nvGrpSpPr>
+      <p:grpSpPr>
+        <a:xfrm>
+          <a:off x="0" y="0"/>
+          <a:ext cx="0" cy="0"/>
+          <a:chOff x="0" y="0"/>
+          <a:chExt cx="0" cy="0"/>
+        </a:xfrm>
+      </p:grpSpPr>
+      <p:sp>
+        <p:nvSpPr>
+          <p:cNvPr id="2" name="Titel 1"/>
+          <p:cNvSpPr>
+            <a:spLocks noGrp="1"/>
+          </p:cNvSpPr>
+          <p:nvPr>
+            <p:ph type="title"/>
+          </p:nvPr>
+        </p:nvSpPr>
+        <p:spPr/>
+        <p:txBody>
+          <a:bodyPr/>
+          <a:lstStyle/>
+          <a:p>
+            <a:r>
+              <a:rPr lang="de-DE" dirty="0" smtClean="0"/>
+              <a:t>Agenda</a:t>
+            </a:r>
+            <a:endParaRPr lang="de-DE" dirty="0"/>
+          </a:p>
+        </p:txBody>
+      </p:sp>
+      <p:sp>
+        <p:nvSpPr>
+          <p:cNvPr id="3" name="Inhaltsplatzhalter 2"/>
+          <p:cNvSpPr>
+            <a:spLocks noGrp="1"/>
+          </p:cNvSpPr>
+          <p:nvPr>
+            <p:ph idx="1"/>
+          </p:nvPr>
+        </p:nvSpPr>
+        <p:spPr/>
+        <p:txBody>
+          <a:bodyPr/>
+          <a:lstStyle/>
+          <a:p>
+            <a:pPr marL="457200" indent="-457200">
+              <a:buFont typeface="+mj-lt"/>
+              <a:buAutoNum type="arabicPeriod"/>
+            </a:pPr>
+            <a:r>
+              <a:rPr lang="de-DE" dirty="0" smtClean="0"/>
+              <a:t>Anforderungsanalyse</a:t>
+            </a:r>
+          </a:p>
+          <a:p>
+            <a:pPr marL="457200" indent="-457200">
+              <a:buFont typeface="+mj-lt"/>
+              <a:buAutoNum type="arabicPeriod"/>
+            </a:pPr>
+            <a:r>
+              <a:rPr lang="de-DE" dirty="0" smtClean="0"/>
+              <a:t>Lösungsansatz 1</a:t>
+            </a:r>
+          </a:p>
+          <a:p>
+            <a:pPr marL="457200" indent="-457200">
+              <a:buFont typeface="+mj-lt"/>
+              <a:buAutoNum type="arabicPeriod"/>
+            </a:pPr>
+            <a:r>
+              <a:rPr lang="de-DE" dirty="0" smtClean="0">
+                <a:solidFill>
+                  <a:srgbClr val="FF0000"/>
+                </a:solidFill>
+              </a:rPr>
+              <a:t>Lösungsansatz </a:t>
+            </a:r>
+            <a:r>
+              <a:rPr lang="de-DE" dirty="0" smtClean="0">
+                <a:solidFill>
+                  <a:srgbClr val="FF0000"/>
+                </a:solidFill>
+              </a:rPr>
+              <a:t>2</a:t>
+            </a:r>
+          </a:p>
+          <a:p>
+            <a:pPr marL="457200" indent="-457200">
+              <a:buFont typeface="+mj-lt"/>
+              <a:buAutoNum type="arabicPeriod"/>
+            </a:pPr>
+            <a:r>
+              <a:rPr lang="de-DE" dirty="0" smtClean="0"/>
+              <a:t>Diskussion</a:t>
+            </a:r>
+            <a:endParaRPr lang="de-DE" dirty="0" smtClean="0"/>
+          </a:p>
+          <a:p>
+            <a:endParaRPr lang="de-DE" dirty="0"/>
+          </a:p>
+        </p:txBody>
+      </p:sp>
+      <p:sp>
+        <p:nvSpPr>
+          <p:cNvPr id="4" name="Datumsplatzhalter 3"/>
+          <p:cNvSpPr>
+            <a:spLocks noGrp="1"/>
+          </p:cNvSpPr>
+          <p:nvPr>
+            <p:ph type="dt" sz="half" idx="10"/>
+          </p:nvPr>
+        </p:nvSpPr>
+        <p:spPr/>
+        <p:txBody>
+          <a:bodyPr/>
+          <a:lstStyle/>
+          <a:p>
+            <a:r>
+              <a:rPr lang="de-DE" smtClean="0"/>
+              <a:t>04.05.2012</a:t>
+            </a:r>
+            <a:endParaRPr lang="de-DE"/>
+          </a:p>
+        </p:txBody>
+      </p:sp>
+      <p:sp>
+        <p:nvSpPr>
+          <p:cNvPr id="5" name="Foliennummernplatzhalter 4"/>
+          <p:cNvSpPr>
+            <a:spLocks noGrp="1"/>
+          </p:cNvSpPr>
+          <p:nvPr>
+            <p:ph type="sldNum" sz="quarter" idx="12"/>
+          </p:nvPr>
+        </p:nvSpPr>
+        <p:spPr/>
+        <p:txBody>
+          <a:bodyPr/>
+          <a:lstStyle/>
+          <a:p>
+            <a:fld id="{6C6AE60A-B69C-4790-82F7-3882EDF23186}" type="slidenum">
+              <a:rPr lang="de-DE" smtClean="0"/>
+              <a:pPr/>
+              <a:t>11</a:t>
+            </a:fld>
+            <a:endParaRPr lang="de-DE"/>
+          </a:p>
+        </p:txBody>
+      </p:sp>
+      <p:sp>
+        <p:nvSpPr>
+          <p:cNvPr id="6" name="Fußzeilenplatzhalter 5"/>
+          <p:cNvSpPr>
+            <a:spLocks noGrp="1"/>
+          </p:cNvSpPr>
+          <p:nvPr>
+            <p:ph type="ftr" sz="quarter" idx="11"/>
+          </p:nvPr>
+        </p:nvSpPr>
+        <p:spPr/>
+        <p:txBody>
+          <a:bodyPr/>
+          <a:lstStyle/>
+          <a:p>
+            <a:r>
+              <a:rPr lang="de-DE" smtClean="0"/>
+              <a:t>KickOff Präsentation</a:t>
+            </a:r>
+            <a:endParaRPr lang="de-DE"/>
+          </a:p>
+        </p:txBody>
+      </p:sp>
+    </p:spTree>
+  </p:cSld>
+  <p:clrMapOvr>
+    <a:masterClrMapping/>
+  </p:clrMapOvr>
+  <p:timing>
+    <p:tnLst>
+      <p:par>
+        <p:cTn id="1" dur="indefinite" restart="never" nodeType="tmRoot"/>
+      </p:par>
+    </p:tnLst>
+  </p:timing>
+</p:sld>
+</file>
+
+<file path=ppt/slides/slide12.xml><?xml version="1.0" encoding="utf-8"?>
 <p:sld xmlns:a="http://schemas.openxmlformats.org/drawingml/2006/main" xmlns:r="http://schemas.openxmlformats.org/officeDocument/2006/relationships" xmlns:p="http://schemas.openxmlformats.org/presentationml/2006/main">
   <p:cSld>
     <p:spTree>
@@ -4084,7 +4312,7 @@
             <a:fld id="{6C6AE60A-B69C-4790-82F7-3882EDF23186}" type="slidenum">
               <a:rPr lang="de-DE" smtClean="0"/>
               <a:pPr/>
-              <a:t>11</a:t>
+              <a:t>12</a:t>
             </a:fld>
             <a:endParaRPr lang="de-DE"/>
           </a:p>
@@ -4623,7 +4851,7 @@
         <p:spPr>
           <a:xfrm>
             <a:off x="6732240" y="5877272"/>
-            <a:ext cx="1912923" cy="523220"/>
+            <a:ext cx="1912923" cy="400110"/>
           </a:xfrm>
           <a:prstGeom prst="rect">
             <a:avLst/>
@@ -4638,7 +4866,7 @@
           <a:p>
             <a:pPr algn="r"/>
             <a:r>
-              <a:rPr lang="de-DE" sz="1400" dirty="0" smtClean="0">
+              <a:rPr lang="de-DE" sz="1000" dirty="0" smtClean="0">
                 <a:solidFill>
                   <a:schemeClr val="bg1"/>
                 </a:solidFill>
@@ -4646,211 +4874,25 @@
               <a:t>[3], [28], [36], [38],</a:t>
             </a:r>
             <a:br>
-              <a:rPr lang="de-DE" sz="1400" dirty="0" smtClean="0">
+              <a:rPr lang="de-DE" sz="1000" dirty="0" smtClean="0">
                 <a:solidFill>
                   <a:schemeClr val="bg1"/>
                 </a:solidFill>
               </a:rPr>
             </a:br>
             <a:r>
-              <a:rPr lang="de-DE" sz="1400" dirty="0" smtClean="0">
+              <a:rPr lang="de-DE" sz="1000" dirty="0" smtClean="0">
                 <a:solidFill>
                   <a:schemeClr val="bg1"/>
                 </a:solidFill>
               </a:rPr>
               <a:t>[39], [40], [41], [42]</a:t>
             </a:r>
-            <a:endParaRPr lang="de-DE" sz="1400" dirty="0">
+            <a:endParaRPr lang="de-DE" sz="1000" dirty="0">
               <a:solidFill>
                 <a:schemeClr val="bg1"/>
               </a:solidFill>
             </a:endParaRPr>
-          </a:p>
-        </p:txBody>
-      </p:sp>
-    </p:spTree>
-  </p:cSld>
-  <p:clrMapOvr>
-    <a:masterClrMapping/>
-  </p:clrMapOvr>
-  <p:timing>
-    <p:tnLst>
-      <p:par>
-        <p:cTn id="1" dur="indefinite" restart="never" nodeType="tmRoot"/>
-      </p:par>
-    </p:tnLst>
-  </p:timing>
-</p:sld>
-</file>
-
-<file path=ppt/slides/slide12.xml><?xml version="1.0" encoding="utf-8"?>
-<p:sld xmlns:a="http://schemas.openxmlformats.org/drawingml/2006/main" xmlns:r="http://schemas.openxmlformats.org/officeDocument/2006/relationships" xmlns:p="http://schemas.openxmlformats.org/presentationml/2006/main">
-  <p:cSld>
-    <p:spTree>
-      <p:nvGrpSpPr>
-        <p:cNvPr id="1" name=""/>
-        <p:cNvGrpSpPr/>
-        <p:nvPr/>
-      </p:nvGrpSpPr>
-      <p:grpSpPr>
-        <a:xfrm>
-          <a:off x="0" y="0"/>
-          <a:ext cx="0" cy="0"/>
-          <a:chOff x="0" y="0"/>
-          <a:chExt cx="0" cy="0"/>
-        </a:xfrm>
-      </p:grpSpPr>
-      <p:sp>
-        <p:nvSpPr>
-          <p:cNvPr id="2" name="Titel 1"/>
-          <p:cNvSpPr>
-            <a:spLocks noGrp="1"/>
-          </p:cNvSpPr>
-          <p:nvPr>
-            <p:ph type="title"/>
-          </p:nvPr>
-        </p:nvSpPr>
-        <p:spPr/>
-        <p:txBody>
-          <a:bodyPr/>
-          <a:lstStyle/>
-          <a:p>
-            <a:r>
-              <a:rPr lang="de-DE" dirty="0" smtClean="0"/>
-              <a:t>Lösungsansatz 2</a:t>
-            </a:r>
-            <a:endParaRPr lang="de-DE" dirty="0"/>
-          </a:p>
-        </p:txBody>
-      </p:sp>
-      <p:sp>
-        <p:nvSpPr>
-          <p:cNvPr id="3" name="Inhaltsplatzhalter 2"/>
-          <p:cNvSpPr>
-            <a:spLocks noGrp="1"/>
-          </p:cNvSpPr>
-          <p:nvPr>
-            <p:ph idx="1"/>
-          </p:nvPr>
-        </p:nvSpPr>
-        <p:spPr/>
-        <p:txBody>
-          <a:bodyPr/>
-          <a:lstStyle/>
-          <a:p>
-            <a:r>
-              <a:rPr lang="de-DE" dirty="0" smtClean="0"/>
-              <a:t>Useraktivität</a:t>
-            </a:r>
-          </a:p>
-          <a:p>
-            <a:pPr lvl="1"/>
-            <a:r>
-              <a:rPr lang="de-DE" dirty="0" smtClean="0"/>
-              <a:t>User braucht nur den </a:t>
-            </a:r>
-            <a:r>
-              <a:rPr lang="de-DE" dirty="0" err="1" smtClean="0"/>
-              <a:t>Excelexport</a:t>
-            </a:r>
-            <a:r>
-              <a:rPr lang="de-DE" dirty="0" smtClean="0"/>
-              <a:t> anzustoßen</a:t>
-            </a:r>
-          </a:p>
-          <a:p>
-            <a:pPr lvl="1"/>
-            <a:r>
-              <a:rPr lang="de-DE" dirty="0" smtClean="0"/>
-              <a:t>Alle andere Aktivitäten passieren automatisch</a:t>
-            </a:r>
-          </a:p>
-          <a:p>
-            <a:endParaRPr lang="de-DE" dirty="0" smtClean="0"/>
-          </a:p>
-          <a:p>
-            <a:r>
-              <a:rPr lang="de-DE" dirty="0" smtClean="0"/>
-              <a:t>Optional</a:t>
-            </a:r>
-          </a:p>
-          <a:p>
-            <a:pPr lvl="1"/>
-            <a:r>
-              <a:rPr lang="de-DE" dirty="0" smtClean="0"/>
-              <a:t>Digitalisieren von Belegen und Anheften an die Reisetagebucheinträge</a:t>
-            </a:r>
-            <a:endParaRPr lang="de-DE" dirty="0"/>
-          </a:p>
-        </p:txBody>
-      </p:sp>
-      <p:sp>
-        <p:nvSpPr>
-          <p:cNvPr id="4" name="Datumsplatzhalter 3"/>
-          <p:cNvSpPr>
-            <a:spLocks noGrp="1"/>
-          </p:cNvSpPr>
-          <p:nvPr>
-            <p:ph type="dt" sz="half" idx="10"/>
-          </p:nvPr>
-        </p:nvSpPr>
-        <p:spPr/>
-        <p:txBody>
-          <a:bodyPr/>
-          <a:lstStyle/>
-          <a:p>
-            <a:r>
-              <a:rPr lang="de-DE" smtClean="0"/>
-              <a:t>04.05.2012</a:t>
-            </a:r>
-            <a:endParaRPr lang="de-DE"/>
-          </a:p>
-        </p:txBody>
-      </p:sp>
-      <p:sp>
-        <p:nvSpPr>
-          <p:cNvPr id="5" name="Fußzeilenplatzhalter 4"/>
-          <p:cNvSpPr>
-            <a:spLocks noGrp="1"/>
-          </p:cNvSpPr>
-          <p:nvPr>
-            <p:ph type="ftr" sz="quarter" idx="11"/>
-          </p:nvPr>
-        </p:nvSpPr>
-        <p:spPr/>
-        <p:txBody>
-          <a:bodyPr/>
-          <a:lstStyle/>
-          <a:p>
-            <a:r>
-              <a:rPr lang="de-DE" smtClean="0"/>
-              <a:t>KickOff Präsentation</a:t>
-            </a:r>
-            <a:endParaRPr lang="de-DE"/>
-          </a:p>
-        </p:txBody>
-      </p:sp>
-      <p:sp>
-        <p:nvSpPr>
-          <p:cNvPr id="6" name="Foliennummernplatzhalter 5"/>
-          <p:cNvSpPr>
-            <a:spLocks noGrp="1"/>
-          </p:cNvSpPr>
-          <p:nvPr>
-            <p:ph type="sldNum" sz="quarter" idx="12"/>
-          </p:nvPr>
-        </p:nvSpPr>
-        <p:spPr/>
-        <p:txBody>
-          <a:bodyPr/>
-          <a:lstStyle/>
-          <a:p>
-            <a:fld id="{6C6AE60A-B69C-4790-82F7-3882EDF23186}" type="slidenum">
-              <a:rPr lang="de-DE" smtClean="0"/>
-              <a:pPr/>
-              <a:t>12</a:t>
-            </a:fld>
-            <a:endParaRPr lang="de-DE"/>
           </a:p>
         </p:txBody>
       </p:sp>
@@ -4926,53 +4968,47 @@
           <a:p>
             <a:r>
               <a:rPr lang="de-DE" dirty="0" smtClean="0"/>
-              <a:t>Projektplanung</a:t>
+              <a:t>Useraktivität</a:t>
             </a:r>
           </a:p>
           <a:p>
             <a:pPr lvl="1"/>
             <a:r>
               <a:rPr lang="de-DE" dirty="0" smtClean="0"/>
-              <a:t>MS1: Paper </a:t>
+              <a:t>User braucht nur den </a:t>
             </a:r>
             <a:r>
               <a:rPr lang="de-DE" dirty="0" err="1" smtClean="0"/>
-              <a:t>Prototyping</a:t>
-            </a:r>
+              <a:t>Excelexport</a:t>
+            </a:r>
+            <a:r>
+              <a:rPr lang="de-DE" dirty="0" smtClean="0"/>
+              <a:t> anzustoßen</a:t>
+            </a:r>
+          </a:p>
+          <a:p>
+            <a:pPr lvl="1"/>
+            <a:r>
+              <a:rPr lang="de-DE" dirty="0" smtClean="0"/>
+              <a:t>Alle andere Aktivitäten passieren automatisch</a:t>
+            </a:r>
+          </a:p>
+          <a:p>
             <a:endParaRPr lang="de-DE" dirty="0" smtClean="0"/>
           </a:p>
           <a:p>
+            <a:r>
+              <a:rPr lang="de-DE" dirty="0" smtClean="0"/>
+              <a:t>Optional</a:t>
+            </a:r>
+          </a:p>
+          <a:p>
             <a:pPr lvl="1"/>
             <a:r>
               <a:rPr lang="de-DE" dirty="0" smtClean="0"/>
-              <a:t>MS2: Outlookexport der Termine</a:t>
-            </a:r>
-          </a:p>
-          <a:p>
-            <a:pPr lvl="1"/>
-            <a:r>
-              <a:rPr lang="de-DE" dirty="0" smtClean="0"/>
-              <a:t>MS3: Basisversion der </a:t>
-            </a:r>
-            <a:r>
-              <a:rPr lang="de-DE" dirty="0" err="1" smtClean="0"/>
-              <a:t>App</a:t>
-            </a:r>
-            <a:endParaRPr lang="de-DE" dirty="0" smtClean="0"/>
-          </a:p>
-          <a:p>
-            <a:pPr lvl="1"/>
-            <a:r>
-              <a:rPr lang="de-DE" dirty="0" smtClean="0"/>
-              <a:t>MS4: Bugfixing, Export nach Excel</a:t>
-            </a:r>
-          </a:p>
-          <a:p>
-            <a:pPr lvl="1"/>
-            <a:r>
-              <a:rPr lang="de-DE" dirty="0" smtClean="0"/>
-              <a:t>MS5: Optimierung &amp; Optionale Features</a:t>
-            </a:r>
+              <a:t>Digitalisieren von Belegen und Anheften an die Reisetagebucheinträge</a:t>
+            </a:r>
+            <a:endParaRPr lang="de-DE" dirty="0"/>
           </a:p>
         </p:txBody>
       </p:sp>
@@ -5093,6 +5129,279 @@
           <a:bodyPr/>
           <a:lstStyle/>
           <a:p>
+            <a:r>
+              <a:rPr lang="de-DE" dirty="0" smtClean="0"/>
+              <a:t>Lösungsansatz 2</a:t>
+            </a:r>
+            <a:endParaRPr lang="de-DE" dirty="0"/>
+          </a:p>
+        </p:txBody>
+      </p:sp>
+      <p:sp>
+        <p:nvSpPr>
+          <p:cNvPr id="3" name="Inhaltsplatzhalter 2"/>
+          <p:cNvSpPr>
+            <a:spLocks noGrp="1"/>
+          </p:cNvSpPr>
+          <p:nvPr>
+            <p:ph idx="1"/>
+          </p:nvPr>
+        </p:nvSpPr>
+        <p:spPr>
+          <a:xfrm>
+            <a:off x="457200" y="1124744"/>
+            <a:ext cx="8507288" cy="5001419"/>
+          </a:xfrm>
+        </p:spPr>
+        <p:txBody>
+          <a:bodyPr/>
+          <a:lstStyle/>
+          <a:p>
+            <a:r>
+              <a:rPr lang="de-DE" dirty="0" smtClean="0"/>
+              <a:t>Projektplanung</a:t>
+            </a:r>
+          </a:p>
+          <a:p>
+            <a:pPr lvl="1"/>
+            <a:r>
+              <a:rPr lang="de-DE" dirty="0" smtClean="0"/>
+              <a:t>Zeitraum: 04.05 – </a:t>
+            </a:r>
+            <a:r>
+              <a:rPr lang="de-DE" dirty="0" smtClean="0"/>
+              <a:t>06.07.2012</a:t>
+            </a:r>
+            <a:endParaRPr lang="de-DE" dirty="0" smtClean="0"/>
+          </a:p>
+          <a:p>
+            <a:pPr lvl="2"/>
+            <a:r>
+              <a:rPr lang="de-DE" b="1" dirty="0" smtClean="0"/>
+              <a:t>MS1</a:t>
+            </a:r>
+            <a:r>
+              <a:rPr lang="de-DE" dirty="0" smtClean="0"/>
+              <a:t> (1 Woche, - 11.05</a:t>
+            </a:r>
+            <a:r>
+              <a:rPr lang="de-DE" dirty="0" smtClean="0"/>
+              <a:t>):		</a:t>
+            </a:r>
+            <a:r>
+              <a:rPr lang="de-DE" dirty="0" smtClean="0"/>
+              <a:t>Paper </a:t>
+            </a:r>
+            <a:r>
+              <a:rPr lang="de-DE" dirty="0" err="1" smtClean="0"/>
+              <a:t>Prototyping</a:t>
+            </a:r>
+            <a:endParaRPr lang="de-DE" dirty="0" smtClean="0"/>
+          </a:p>
+          <a:p>
+            <a:pPr lvl="2"/>
+            <a:r>
+              <a:rPr lang="de-DE" b="1" dirty="0" smtClean="0"/>
+              <a:t>MS2 </a:t>
+            </a:r>
+            <a:r>
+              <a:rPr lang="de-DE" dirty="0" smtClean="0"/>
+              <a:t>(2 Wochen, - 25.05): </a:t>
+            </a:r>
+            <a:r>
+              <a:rPr lang="de-DE" dirty="0" smtClean="0"/>
+              <a:t>	Outlookexport </a:t>
+            </a:r>
+            <a:r>
+              <a:rPr lang="de-DE" dirty="0" smtClean="0"/>
+              <a:t>der Termine</a:t>
+            </a:r>
+          </a:p>
+          <a:p>
+            <a:pPr lvl="2"/>
+            <a:r>
+              <a:rPr lang="de-DE" b="1" dirty="0" smtClean="0"/>
+              <a:t>MS3</a:t>
+            </a:r>
+            <a:r>
+              <a:rPr lang="de-DE" dirty="0" smtClean="0"/>
+              <a:t> (2 Wochen, - 08.06): </a:t>
+            </a:r>
+            <a:r>
+              <a:rPr lang="de-DE" dirty="0" smtClean="0"/>
+              <a:t>	Basisversion </a:t>
+            </a:r>
+            <a:r>
+              <a:rPr lang="de-DE" dirty="0" smtClean="0"/>
+              <a:t>der </a:t>
+            </a:r>
+            <a:r>
+              <a:rPr lang="de-DE" dirty="0" err="1" smtClean="0"/>
+              <a:t>App</a:t>
+            </a:r>
+            <a:endParaRPr lang="de-DE" dirty="0" smtClean="0"/>
+          </a:p>
+          <a:p>
+            <a:pPr lvl="2"/>
+            <a:r>
+              <a:rPr lang="de-DE" b="1" dirty="0" smtClean="0"/>
+              <a:t>MS4</a:t>
+            </a:r>
+            <a:r>
+              <a:rPr lang="de-DE" dirty="0" smtClean="0"/>
+              <a:t> (2 Wochen, - 22.06): </a:t>
+            </a:r>
+            <a:r>
+              <a:rPr lang="de-DE" dirty="0" smtClean="0"/>
+              <a:t>	Bugfixing</a:t>
+            </a:r>
+            <a:r>
+              <a:rPr lang="de-DE" dirty="0" smtClean="0"/>
+              <a:t>, Export nach Excel</a:t>
+            </a:r>
+          </a:p>
+          <a:p>
+            <a:pPr lvl="2"/>
+            <a:r>
+              <a:rPr lang="de-DE" b="1" dirty="0" smtClean="0"/>
+              <a:t>MS5</a:t>
+            </a:r>
+            <a:r>
+              <a:rPr lang="de-DE" dirty="0" smtClean="0"/>
+              <a:t> (2 Wochen, - 06.07): </a:t>
+            </a:r>
+            <a:r>
+              <a:rPr lang="de-DE" dirty="0" smtClean="0"/>
+              <a:t>	Optimierung </a:t>
+            </a:r>
+            <a:r>
+              <a:rPr lang="de-DE" dirty="0" smtClean="0"/>
+              <a:t>&amp; Optionale Features</a:t>
+            </a:r>
+          </a:p>
+        </p:txBody>
+      </p:sp>
+      <p:sp>
+        <p:nvSpPr>
+          <p:cNvPr id="4" name="Datumsplatzhalter 3"/>
+          <p:cNvSpPr>
+            <a:spLocks noGrp="1"/>
+          </p:cNvSpPr>
+          <p:nvPr>
+            <p:ph type="dt" sz="half" idx="10"/>
+          </p:nvPr>
+        </p:nvSpPr>
+        <p:spPr/>
+        <p:txBody>
+          <a:bodyPr/>
+          <a:lstStyle/>
+          <a:p>
+            <a:r>
+              <a:rPr lang="de-DE" smtClean="0"/>
+              <a:t>04.05.2012</a:t>
+            </a:r>
+            <a:endParaRPr lang="de-DE"/>
+          </a:p>
+        </p:txBody>
+      </p:sp>
+      <p:sp>
+        <p:nvSpPr>
+          <p:cNvPr id="5" name="Fußzeilenplatzhalter 4"/>
+          <p:cNvSpPr>
+            <a:spLocks noGrp="1"/>
+          </p:cNvSpPr>
+          <p:nvPr>
+            <p:ph type="ftr" sz="quarter" idx="11"/>
+          </p:nvPr>
+        </p:nvSpPr>
+        <p:spPr/>
+        <p:txBody>
+          <a:bodyPr/>
+          <a:lstStyle/>
+          <a:p>
+            <a:r>
+              <a:rPr lang="de-DE" smtClean="0"/>
+              <a:t>KickOff Präsentation</a:t>
+            </a:r>
+            <a:endParaRPr lang="de-DE"/>
+          </a:p>
+        </p:txBody>
+      </p:sp>
+      <p:sp>
+        <p:nvSpPr>
+          <p:cNvPr id="6" name="Foliennummernplatzhalter 5"/>
+          <p:cNvSpPr>
+            <a:spLocks noGrp="1"/>
+          </p:cNvSpPr>
+          <p:nvPr>
+            <p:ph type="sldNum" sz="quarter" idx="12"/>
+          </p:nvPr>
+        </p:nvSpPr>
+        <p:spPr/>
+        <p:txBody>
+          <a:bodyPr/>
+          <a:lstStyle/>
+          <a:p>
+            <a:fld id="{6C6AE60A-B69C-4790-82F7-3882EDF23186}" type="slidenum">
+              <a:rPr lang="de-DE" smtClean="0"/>
+              <a:pPr/>
+              <a:t>14</a:t>
+            </a:fld>
+            <a:endParaRPr lang="de-DE"/>
+          </a:p>
+        </p:txBody>
+      </p:sp>
+    </p:spTree>
+  </p:cSld>
+  <p:clrMapOvr>
+    <a:masterClrMapping/>
+  </p:clrMapOvr>
+  <p:timing>
+    <p:tnLst>
+      <p:par>
+        <p:cTn id="1" dur="indefinite" restart="never" nodeType="tmRoot"/>
+      </p:par>
+    </p:tnLst>
+  </p:timing>
+</p:sld>
+</file>
+
+<file path=ppt/slides/slide15.xml><?xml version="1.0" encoding="utf-8"?>
+<p:sld xmlns:a="http://schemas.openxmlformats.org/drawingml/2006/main" xmlns:r="http://schemas.openxmlformats.org/officeDocument/2006/relationships" xmlns:p="http://schemas.openxmlformats.org/presentationml/2006/main">
+  <p:cSld>
+    <p:spTree>
+      <p:nvGrpSpPr>
+        <p:cNvPr id="1" name=""/>
+        <p:cNvGrpSpPr/>
+        <p:nvPr/>
+      </p:nvGrpSpPr>
+      <p:grpSpPr>
+        <a:xfrm>
+          <a:off x="0" y="0"/>
+          <a:ext cx="0" cy="0"/>
+          <a:chOff x="0" y="0"/>
+          <a:chExt cx="0" cy="0"/>
+        </a:xfrm>
+      </p:grpSpPr>
+      <p:sp>
+        <p:nvSpPr>
+          <p:cNvPr id="2" name="Titel 1"/>
+          <p:cNvSpPr>
+            <a:spLocks noGrp="1"/>
+          </p:cNvSpPr>
+          <p:nvPr>
+            <p:ph type="title"/>
+          </p:nvPr>
+        </p:nvSpPr>
+        <p:spPr/>
+        <p:txBody>
+          <a:bodyPr/>
+          <a:lstStyle/>
+          <a:p>
+            <a:r>
+              <a:rPr lang="de-DE" dirty="0" smtClean="0"/>
+              <a:t>Diskussion</a:t>
+            </a:r>
             <a:endParaRPr lang="de-DE" dirty="0"/>
           </a:p>
         </p:txBody>
@@ -5198,7 +5507,7 @@
             <a:fld id="{6C6AE60A-B69C-4790-82F7-3882EDF23186}" type="slidenum">
               <a:rPr lang="de-DE" smtClean="0"/>
               <a:pPr/>
-              <a:t>14</a:t>
+              <a:t>15</a:t>
             </a:fld>
             <a:endParaRPr lang="de-DE"/>
           </a:p>
@@ -5336,7 +5645,7 @@
 </p:sld>
 </file>
 
-<file path=ppt/slides/slide15.xml><?xml version="1.0" encoding="utf-8"?>
+<file path=ppt/slides/slide16.xml><?xml version="1.0" encoding="utf-8"?>
 <p:sld xmlns:a="http://schemas.openxmlformats.org/drawingml/2006/main" xmlns:r="http://schemas.openxmlformats.org/officeDocument/2006/relationships" xmlns:p="http://schemas.openxmlformats.org/presentationml/2006/main">
   <p:cSld>
     <p:spTree>
@@ -6190,902 +6499,6 @@
                           <a:hlinkClick r:id="rId13"/>
                         </a:rPr>
                         <a:t>http://www.iconarchive.com/show/sleek-xp-basic-icons-by-deleket/Home-icon.html</a:t>
-                      </a:r>
-                      <a:r>
-                        <a:rPr lang="de-DE" sz="1400" dirty="0" smtClean="0"/>
-                        <a:t> </a:t>
-                      </a:r>
-                      <a:endParaRPr lang="de-DE" sz="1400" dirty="0"/>
-                    </a:p>
-                  </a:txBody>
-                  <a:tcPr/>
-                </a:tc>
-              </a:tr>
-            </a:tbl>
-          </a:graphicData>
-        </a:graphic>
-      </p:graphicFrame>
-      <p:sp>
-        <p:nvSpPr>
-          <p:cNvPr id="4" name="Datumsplatzhalter 3"/>
-          <p:cNvSpPr>
-            <a:spLocks noGrp="1"/>
-          </p:cNvSpPr>
-          <p:nvPr>
-            <p:ph type="dt" sz="half" idx="10"/>
-          </p:nvPr>
-        </p:nvSpPr>
-        <p:spPr/>
-        <p:txBody>
-          <a:bodyPr/>
-          <a:lstStyle/>
-          <a:p>
-            <a:r>
-              <a:rPr lang="de-DE" smtClean="0"/>
-              <a:t>04.05.2012</a:t>
-            </a:r>
-            <a:endParaRPr lang="de-DE"/>
-          </a:p>
-        </p:txBody>
-      </p:sp>
-      <p:sp>
-        <p:nvSpPr>
-          <p:cNvPr id="5" name="Fußzeilenplatzhalter 4"/>
-          <p:cNvSpPr>
-            <a:spLocks noGrp="1"/>
-          </p:cNvSpPr>
-          <p:nvPr>
-            <p:ph type="ftr" sz="quarter" idx="11"/>
-          </p:nvPr>
-        </p:nvSpPr>
-        <p:spPr/>
-        <p:txBody>
-          <a:bodyPr/>
-          <a:lstStyle/>
-          <a:p>
-            <a:r>
-              <a:rPr lang="de-DE" smtClean="0"/>
-              <a:t>KickOff Präsentation</a:t>
-            </a:r>
-            <a:endParaRPr lang="de-DE"/>
-          </a:p>
-        </p:txBody>
-      </p:sp>
-      <p:sp>
-        <p:nvSpPr>
-          <p:cNvPr id="6" name="Foliennummernplatzhalter 5"/>
-          <p:cNvSpPr>
-            <a:spLocks noGrp="1"/>
-          </p:cNvSpPr>
-          <p:nvPr>
-            <p:ph type="sldNum" sz="quarter" idx="12"/>
-          </p:nvPr>
-        </p:nvSpPr>
-        <p:spPr/>
-        <p:txBody>
-          <a:bodyPr/>
-          <a:lstStyle/>
-          <a:p>
-            <a:fld id="{6C6AE60A-B69C-4790-82F7-3882EDF23186}" type="slidenum">
-              <a:rPr lang="de-DE" smtClean="0"/>
-              <a:pPr/>
-              <a:t>15</a:t>
-            </a:fld>
-            <a:endParaRPr lang="de-DE"/>
-          </a:p>
-        </p:txBody>
-      </p:sp>
-    </p:spTree>
-  </p:cSld>
-  <p:clrMapOvr>
-    <a:masterClrMapping/>
-  </p:clrMapOvr>
-  <p:timing>
-    <p:tnLst>
-      <p:par>
-        <p:cTn id="1" dur="indefinite" restart="never" nodeType="tmRoot"/>
-      </p:par>
-    </p:tnLst>
-  </p:timing>
-</p:sld>
-</file>
-
-<file path=ppt/slides/slide16.xml><?xml version="1.0" encoding="utf-8"?>
-<p:sld xmlns:a="http://schemas.openxmlformats.org/drawingml/2006/main" xmlns:r="http://schemas.openxmlformats.org/officeDocument/2006/relationships" xmlns:p="http://schemas.openxmlformats.org/presentationml/2006/main">
-  <p:cSld>
-    <p:spTree>
-      <p:nvGrpSpPr>
-        <p:cNvPr id="1" name=""/>
-        <p:cNvGrpSpPr/>
-        <p:nvPr/>
-      </p:nvGrpSpPr>
-      <p:grpSpPr>
-        <a:xfrm>
-          <a:off x="0" y="0"/>
-          <a:ext cx="0" cy="0"/>
-          <a:chOff x="0" y="0"/>
-          <a:chExt cx="0" cy="0"/>
-        </a:xfrm>
-      </p:grpSpPr>
-      <p:sp>
-        <p:nvSpPr>
-          <p:cNvPr id="2" name="Titel 1"/>
-          <p:cNvSpPr>
-            <a:spLocks noGrp="1"/>
-          </p:cNvSpPr>
-          <p:nvPr>
-            <p:ph type="title"/>
-          </p:nvPr>
-        </p:nvSpPr>
-        <p:spPr/>
-        <p:txBody>
-          <a:bodyPr/>
-          <a:lstStyle/>
-          <a:p>
-            <a:r>
-              <a:rPr lang="de-DE" dirty="0" smtClean="0"/>
-              <a:t>Quellen</a:t>
-            </a:r>
-            <a:endParaRPr lang="de-DE" dirty="0"/>
-          </a:p>
-        </p:txBody>
-      </p:sp>
-      <p:graphicFrame>
-        <p:nvGraphicFramePr>
-          <p:cNvPr id="7" name="Inhaltsplatzhalter 6"/>
-          <p:cNvGraphicFramePr>
-            <a:graphicFrameLocks noGrp="1"/>
-          </p:cNvGraphicFramePr>
-          <p:nvPr>
-            <p:ph idx="1"/>
-          </p:nvPr>
-        </p:nvGraphicFramePr>
-        <p:xfrm>
-          <a:off x="323528" y="1125538"/>
-          <a:ext cx="8568952" cy="4749800"/>
-        </p:xfrm>
-        <a:graphic>
-          <a:graphicData uri="http://schemas.openxmlformats.org/drawingml/2006/table">
-            <a:tbl>
-              <a:tblPr firstRow="1" bandRow="1">
-                <a:tableStyleId>{2D5ABB26-0587-4C30-8999-92F81FD0307C}</a:tableStyleId>
-              </a:tblPr>
-              <a:tblGrid>
-                <a:gridCol w="504056"/>
-                <a:gridCol w="1152128"/>
-                <a:gridCol w="6912768"/>
-              </a:tblGrid>
-              <a:tr h="287238">
-                <a:tc>
-                  <a:txBody>
-                    <a:bodyPr/>
-                    <a:lstStyle/>
-                    <a:p>
-                      <a:r>
-                        <a:rPr lang="de-DE" sz="1400" dirty="0" smtClean="0">
-                          <a:solidFill>
-                            <a:schemeClr val="bg1"/>
-                          </a:solidFill>
-                        </a:rPr>
-                        <a:t>[13]</a:t>
-                      </a:r>
-                      <a:endParaRPr lang="de-DE" sz="1400" b="0" dirty="0">
-                        <a:solidFill>
-                          <a:schemeClr val="bg1"/>
-                        </a:solidFill>
-                      </a:endParaRPr>
-                    </a:p>
-                  </a:txBody>
-                  <a:tcPr/>
-                </a:tc>
-                <a:tc>
-                  <a:txBody>
-                    <a:bodyPr/>
-                    <a:lstStyle/>
-                    <a:p>
-                      <a:r>
-                        <a:rPr lang="de-DE" sz="1400" dirty="0" smtClean="0">
-                          <a:solidFill>
-                            <a:schemeClr val="bg1"/>
-                          </a:solidFill>
-                        </a:rPr>
-                        <a:t>Ortsschild B</a:t>
-                      </a:r>
-                      <a:endParaRPr lang="de-DE" sz="1400" b="0" dirty="0">
-                        <a:solidFill>
-                          <a:schemeClr val="bg1"/>
-                        </a:solidFill>
-                      </a:endParaRPr>
-                    </a:p>
-                  </a:txBody>
-                  <a:tcPr/>
-                </a:tc>
-                <a:tc>
-                  <a:txBody>
-                    <a:bodyPr/>
-                    <a:lstStyle/>
-                    <a:p>
-                      <a:r>
-                        <a:rPr lang="de-DE" sz="1400" dirty="0" smtClean="0">
-                          <a:hlinkClick r:id="rId2"/>
-                        </a:rPr>
-                        <a:t>http://onlinestreet.de/strassen/ortsschild/Berlin.Neuk%F6lln.html</a:t>
-                      </a:r>
-                      <a:r>
-                        <a:rPr lang="de-DE" sz="1400" dirty="0" smtClean="0"/>
-                        <a:t> </a:t>
-                      </a:r>
-                      <a:endParaRPr lang="de-DE" sz="1400" b="0" dirty="0"/>
-                    </a:p>
-                  </a:txBody>
-                  <a:tcPr/>
-                </a:tc>
-              </a:tr>
-              <a:tr h="370840">
-                <a:tc>
-                  <a:txBody>
-                    <a:bodyPr/>
-                    <a:lstStyle/>
-                    <a:p>
-                      <a:r>
-                        <a:rPr lang="de-DE" sz="1400" dirty="0" smtClean="0">
-                          <a:solidFill>
-                            <a:schemeClr val="bg1"/>
-                          </a:solidFill>
-                        </a:rPr>
-                        <a:t>[14]</a:t>
-                      </a:r>
-                      <a:endParaRPr lang="de-DE" sz="1400" dirty="0">
-                        <a:solidFill>
-                          <a:schemeClr val="bg1"/>
-                        </a:solidFill>
-                      </a:endParaRPr>
-                    </a:p>
-                  </a:txBody>
-                  <a:tcPr/>
-                </a:tc>
-                <a:tc>
-                  <a:txBody>
-                    <a:bodyPr/>
-                    <a:lstStyle/>
-                    <a:p>
-                      <a:r>
-                        <a:rPr lang="de-DE" sz="1400" dirty="0" smtClean="0">
-                          <a:solidFill>
-                            <a:schemeClr val="bg1"/>
-                          </a:solidFill>
-                        </a:rPr>
-                        <a:t>Auto</a:t>
-                      </a:r>
-                      <a:endParaRPr lang="de-DE" sz="1400" dirty="0">
-                        <a:solidFill>
-                          <a:schemeClr val="bg1"/>
-                        </a:solidFill>
-                      </a:endParaRPr>
-                    </a:p>
-                  </a:txBody>
-                  <a:tcPr/>
-                </a:tc>
-                <a:tc>
-                  <a:txBody>
-                    <a:bodyPr/>
-                    <a:lstStyle/>
-                    <a:p>
-                      <a:r>
-                        <a:rPr lang="de-DE" sz="1400" dirty="0" smtClean="0">
-                          <a:hlinkClick r:id="rId3"/>
-                        </a:rPr>
-                        <a:t>http://www.iconarchive.com/show/transport-icons-by-icons-land/Car-icon.html</a:t>
-                      </a:r>
-                      <a:r>
-                        <a:rPr lang="de-DE" sz="1400" dirty="0" smtClean="0"/>
-                        <a:t> </a:t>
-                      </a:r>
-                      <a:endParaRPr lang="de-DE" sz="1400" dirty="0"/>
-                    </a:p>
-                  </a:txBody>
-                  <a:tcPr/>
-                </a:tc>
-              </a:tr>
-              <a:tr h="370840">
-                <a:tc>
-                  <a:txBody>
-                    <a:bodyPr/>
-                    <a:lstStyle/>
-                    <a:p>
-                      <a:r>
-                        <a:rPr lang="de-DE" sz="1400" dirty="0" smtClean="0">
-                          <a:solidFill>
-                            <a:schemeClr val="bg1"/>
-                          </a:solidFill>
-                        </a:rPr>
-                        <a:t>[15]</a:t>
-                      </a:r>
-                      <a:endParaRPr lang="de-DE" sz="1400" dirty="0">
-                        <a:solidFill>
-                          <a:schemeClr val="bg1"/>
-                        </a:solidFill>
-                      </a:endParaRPr>
-                    </a:p>
-                  </a:txBody>
-                  <a:tcPr/>
-                </a:tc>
-                <a:tc>
-                  <a:txBody>
-                    <a:bodyPr/>
-                    <a:lstStyle/>
-                    <a:p>
-                      <a:r>
-                        <a:rPr lang="de-DE" sz="1400" dirty="0" smtClean="0">
-                          <a:solidFill>
-                            <a:schemeClr val="bg1"/>
-                          </a:solidFill>
-                        </a:rPr>
-                        <a:t>Bahn Logo</a:t>
-                      </a:r>
-                      <a:endParaRPr lang="de-DE" sz="1400" dirty="0">
-                        <a:solidFill>
-                          <a:schemeClr val="bg1"/>
-                        </a:solidFill>
-                      </a:endParaRPr>
-                    </a:p>
-                  </a:txBody>
-                  <a:tcPr/>
-                </a:tc>
-                <a:tc>
-                  <a:txBody>
-                    <a:bodyPr/>
-                    <a:lstStyle/>
-                    <a:p>
-                      <a:r>
-                        <a:rPr lang="de-DE" sz="1400" dirty="0" smtClean="0">
-                          <a:hlinkClick r:id="rId4"/>
-                        </a:rPr>
-                        <a:t>http://smartphonearea.de/2009/12/appstore-db-navigator-offizielle-bahn-applikation/</a:t>
-                      </a:r>
-                      <a:r>
-                        <a:rPr lang="de-DE" sz="1400" dirty="0" smtClean="0"/>
-                        <a:t> </a:t>
-                      </a:r>
-                      <a:endParaRPr lang="de-DE" sz="1400" dirty="0"/>
-                    </a:p>
-                  </a:txBody>
-                  <a:tcPr/>
-                </a:tc>
-              </a:tr>
-              <a:tr h="370840">
-                <a:tc>
-                  <a:txBody>
-                    <a:bodyPr/>
-                    <a:lstStyle/>
-                    <a:p>
-                      <a:r>
-                        <a:rPr lang="de-DE" sz="1400" dirty="0" smtClean="0">
-                          <a:solidFill>
-                            <a:schemeClr val="bg1"/>
-                          </a:solidFill>
-                        </a:rPr>
-                        <a:t>[16]</a:t>
-                      </a:r>
-                      <a:endParaRPr lang="de-DE" sz="1400" dirty="0">
-                        <a:solidFill>
-                          <a:schemeClr val="bg1"/>
-                        </a:solidFill>
-                      </a:endParaRPr>
-                    </a:p>
-                  </a:txBody>
-                  <a:tcPr/>
-                </a:tc>
-                <a:tc>
-                  <a:txBody>
-                    <a:bodyPr/>
-                    <a:lstStyle/>
-                    <a:p>
-                      <a:r>
-                        <a:rPr lang="de-DE" sz="1400" dirty="0" smtClean="0">
-                          <a:solidFill>
-                            <a:schemeClr val="bg1"/>
-                          </a:solidFill>
-                        </a:rPr>
-                        <a:t>Zug</a:t>
-                      </a:r>
-                      <a:endParaRPr lang="de-DE" sz="1400" dirty="0">
-                        <a:solidFill>
-                          <a:schemeClr val="bg1"/>
-                        </a:solidFill>
-                      </a:endParaRPr>
-                    </a:p>
-                  </a:txBody>
-                  <a:tcPr/>
-                </a:tc>
-                <a:tc>
-                  <a:txBody>
-                    <a:bodyPr/>
-                    <a:lstStyle/>
-                    <a:p>
-                      <a:r>
-                        <a:rPr lang="de-DE" sz="1400" dirty="0" smtClean="0">
-                          <a:hlinkClick r:id="rId5"/>
-                        </a:rPr>
-                        <a:t>http://www.iconarchive.com/show/vista-artistic-icons-by-awicons/2-Hot-Train-icon.html</a:t>
-                      </a:r>
-                      <a:r>
-                        <a:rPr lang="de-DE" sz="1400" dirty="0" smtClean="0"/>
-                        <a:t> </a:t>
-                      </a:r>
-                      <a:endParaRPr lang="de-DE" sz="1400" dirty="0"/>
-                    </a:p>
-                  </a:txBody>
-                  <a:tcPr/>
-                </a:tc>
-              </a:tr>
-              <a:tr h="370840">
-                <a:tc>
-                  <a:txBody>
-                    <a:bodyPr/>
-                    <a:lstStyle/>
-                    <a:p>
-                      <a:r>
-                        <a:rPr lang="de-DE" sz="1400" dirty="0" smtClean="0">
-                          <a:solidFill>
-                            <a:schemeClr val="bg1"/>
-                          </a:solidFill>
-                        </a:rPr>
-                        <a:t>[17]</a:t>
-                      </a:r>
-                      <a:endParaRPr lang="de-DE" sz="1400" dirty="0">
-                        <a:solidFill>
-                          <a:schemeClr val="bg1"/>
-                        </a:solidFill>
-                      </a:endParaRPr>
-                    </a:p>
-                  </a:txBody>
-                  <a:tcPr/>
-                </a:tc>
-                <a:tc>
-                  <a:txBody>
-                    <a:bodyPr/>
-                    <a:lstStyle/>
-                    <a:p>
-                      <a:r>
-                        <a:rPr lang="de-DE" sz="1400" dirty="0" smtClean="0">
-                          <a:solidFill>
-                            <a:schemeClr val="bg1"/>
-                          </a:solidFill>
-                        </a:rPr>
-                        <a:t>Bahncard</a:t>
-                      </a:r>
-                      <a:endParaRPr lang="de-DE" sz="1400" dirty="0">
-                        <a:solidFill>
-                          <a:schemeClr val="bg1"/>
-                        </a:solidFill>
-                      </a:endParaRPr>
-                    </a:p>
-                  </a:txBody>
-                  <a:tcPr/>
-                </a:tc>
-                <a:tc>
-                  <a:txBody>
-                    <a:bodyPr/>
-                    <a:lstStyle/>
-                    <a:p>
-                      <a:r>
-                        <a:rPr lang="de-DE" sz="1400" dirty="0" smtClean="0">
-                          <a:hlinkClick r:id="rId6"/>
-                        </a:rPr>
-                        <a:t>http://de.wikipedia.org/w/index.php?title=Datei:Bahncard_100_102009.png&amp;filetimestamp=20101123214027</a:t>
-                      </a:r>
-                      <a:r>
-                        <a:rPr lang="de-DE" sz="1400" dirty="0" smtClean="0"/>
-                        <a:t> </a:t>
-                      </a:r>
-                      <a:endParaRPr lang="de-DE" sz="1400" dirty="0"/>
-                    </a:p>
-                  </a:txBody>
-                  <a:tcPr/>
-                </a:tc>
-              </a:tr>
-              <a:tr h="370840">
-                <a:tc>
-                  <a:txBody>
-                    <a:bodyPr/>
-                    <a:lstStyle/>
-                    <a:p>
-                      <a:r>
-                        <a:rPr lang="de-DE" sz="1400" dirty="0" smtClean="0">
-                          <a:solidFill>
-                            <a:schemeClr val="bg1"/>
-                          </a:solidFill>
-                        </a:rPr>
-                        <a:t>[18]</a:t>
-                      </a:r>
-                      <a:endParaRPr lang="de-DE" sz="1400" dirty="0">
-                        <a:solidFill>
-                          <a:schemeClr val="bg1"/>
-                        </a:solidFill>
-                      </a:endParaRPr>
-                    </a:p>
-                  </a:txBody>
-                  <a:tcPr/>
-                </a:tc>
-                <a:tc>
-                  <a:txBody>
-                    <a:bodyPr/>
-                    <a:lstStyle/>
-                    <a:p>
-                      <a:r>
-                        <a:rPr lang="de-DE" sz="1400" dirty="0" smtClean="0">
-                          <a:solidFill>
-                            <a:schemeClr val="bg1"/>
-                          </a:solidFill>
-                        </a:rPr>
-                        <a:t>Ticket X</a:t>
-                      </a:r>
-                      <a:endParaRPr lang="de-DE" sz="1400" dirty="0">
-                        <a:solidFill>
-                          <a:schemeClr val="bg1"/>
-                        </a:solidFill>
-                      </a:endParaRPr>
-                    </a:p>
-                  </a:txBody>
-                  <a:tcPr/>
-                </a:tc>
-                <a:tc>
-                  <a:txBody>
-                    <a:bodyPr/>
-                    <a:lstStyle/>
-                    <a:p>
-                      <a:r>
-                        <a:rPr lang="de-DE" sz="1400" dirty="0" smtClean="0">
-                          <a:hlinkClick r:id="rId7"/>
-                        </a:rPr>
-                        <a:t>http://www.iconarchive.com/show/pretty-office-3-icons-by-custom-icon-design/remove-ticket-icon.html</a:t>
-                      </a:r>
-                      <a:r>
-                        <a:rPr lang="de-DE" sz="1400" dirty="0" smtClean="0"/>
-                        <a:t> </a:t>
-                      </a:r>
-                      <a:endParaRPr lang="de-DE" sz="1400" dirty="0"/>
-                    </a:p>
-                  </a:txBody>
-                  <a:tcPr/>
-                </a:tc>
-              </a:tr>
-              <a:tr h="370840">
-                <a:tc>
-                  <a:txBody>
-                    <a:bodyPr/>
-                    <a:lstStyle/>
-                    <a:p>
-                      <a:r>
-                        <a:rPr lang="de-DE" sz="1400" dirty="0" smtClean="0">
-                          <a:solidFill>
-                            <a:schemeClr val="bg1"/>
-                          </a:solidFill>
-                        </a:rPr>
-                        <a:t>[19]</a:t>
-                      </a:r>
-                      <a:endParaRPr lang="de-DE" sz="1400" dirty="0">
-                        <a:solidFill>
-                          <a:schemeClr val="bg1"/>
-                        </a:solidFill>
-                      </a:endParaRPr>
-                    </a:p>
-                  </a:txBody>
-                  <a:tcPr/>
-                </a:tc>
-                <a:tc>
-                  <a:txBody>
-                    <a:bodyPr/>
-                    <a:lstStyle/>
-                    <a:p>
-                      <a:r>
-                        <a:rPr lang="de-DE" sz="1400" dirty="0" err="1" smtClean="0">
-                          <a:solidFill>
-                            <a:schemeClr val="bg1"/>
-                          </a:solidFill>
-                        </a:rPr>
-                        <a:t>Fragezeich</a:t>
-                      </a:r>
-                      <a:r>
-                        <a:rPr lang="de-DE" sz="1400" dirty="0" smtClean="0">
-                          <a:solidFill>
-                            <a:schemeClr val="bg1"/>
-                          </a:solidFill>
-                        </a:rPr>
-                        <a:t>.</a:t>
-                      </a:r>
-                      <a:endParaRPr lang="de-DE" sz="1400" dirty="0">
-                        <a:solidFill>
-                          <a:schemeClr val="bg1"/>
-                        </a:solidFill>
-                      </a:endParaRPr>
-                    </a:p>
-                  </a:txBody>
-                  <a:tcPr/>
-                </a:tc>
-                <a:tc>
-                  <a:txBody>
-                    <a:bodyPr/>
-                    <a:lstStyle/>
-                    <a:p>
-                      <a:r>
-                        <a:rPr lang="de-DE" sz="1400" dirty="0" smtClean="0">
-                          <a:hlinkClick r:id="rId8"/>
-                        </a:rPr>
-                        <a:t>http://www.iconarchive.com/show/3d-cartoon-vol2-icons-by-deleket/Help-And-Support-icon.html</a:t>
-                      </a:r>
-                      <a:r>
-                        <a:rPr lang="de-DE" sz="1400" dirty="0" smtClean="0"/>
-                        <a:t> </a:t>
-                      </a:r>
-                      <a:endParaRPr lang="de-DE" sz="1400" dirty="0"/>
-                    </a:p>
-                  </a:txBody>
-                  <a:tcPr/>
-                </a:tc>
-              </a:tr>
-              <a:tr h="370840">
-                <a:tc>
-                  <a:txBody>
-                    <a:bodyPr/>
-                    <a:lstStyle/>
-                    <a:p>
-                      <a:r>
-                        <a:rPr lang="de-DE" sz="1400" dirty="0" smtClean="0">
-                          <a:solidFill>
-                            <a:schemeClr val="bg1"/>
-                          </a:solidFill>
-                        </a:rPr>
-                        <a:t>[20]</a:t>
-                      </a:r>
-                      <a:endParaRPr lang="de-DE" sz="1400" dirty="0">
-                        <a:solidFill>
-                          <a:schemeClr val="bg1"/>
-                        </a:solidFill>
-                      </a:endParaRPr>
-                    </a:p>
-                  </a:txBody>
-                  <a:tcPr/>
-                </a:tc>
-                <a:tc>
-                  <a:txBody>
-                    <a:bodyPr/>
-                    <a:lstStyle/>
-                    <a:p>
-                      <a:r>
-                        <a:rPr lang="de-DE" sz="1400" dirty="0" err="1" smtClean="0">
-                          <a:solidFill>
-                            <a:schemeClr val="bg1"/>
-                          </a:solidFill>
-                        </a:rPr>
-                        <a:t>Frownie</a:t>
-                      </a:r>
-                      <a:endParaRPr lang="de-DE" sz="1400" dirty="0">
-                        <a:solidFill>
-                          <a:schemeClr val="bg1"/>
-                        </a:solidFill>
-                      </a:endParaRPr>
-                    </a:p>
-                  </a:txBody>
-                  <a:tcPr/>
-                </a:tc>
-                <a:tc>
-                  <a:txBody>
-                    <a:bodyPr/>
-                    <a:lstStyle/>
-                    <a:p>
-                      <a:r>
-                        <a:rPr lang="de-DE" sz="1400" dirty="0" smtClean="0">
-                          <a:hlinkClick r:id="rId9"/>
-                        </a:rPr>
-                        <a:t>http://www.iconarchive.com/show/keriyo-emoticons-icons-by-deleket/Smiley-upset-3-icon.html</a:t>
-                      </a:r>
-                      <a:r>
-                        <a:rPr lang="de-DE" sz="1400" dirty="0" smtClean="0"/>
-                        <a:t> </a:t>
-                      </a:r>
-                      <a:endParaRPr lang="de-DE" sz="1400" dirty="0"/>
-                    </a:p>
-                  </a:txBody>
-                  <a:tcPr/>
-                </a:tc>
-              </a:tr>
-              <a:tr h="370840">
-                <a:tc>
-                  <a:txBody>
-                    <a:bodyPr/>
-                    <a:lstStyle/>
-                    <a:p>
-                      <a:r>
-                        <a:rPr lang="de-DE" sz="1400" dirty="0" smtClean="0">
-                          <a:solidFill>
-                            <a:schemeClr val="bg1"/>
-                          </a:solidFill>
-                        </a:rPr>
-                        <a:t>[21]</a:t>
-                      </a:r>
-                      <a:endParaRPr lang="de-DE" sz="1400" dirty="0">
-                        <a:solidFill>
-                          <a:schemeClr val="bg1"/>
-                        </a:solidFill>
-                      </a:endParaRPr>
-                    </a:p>
-                  </a:txBody>
-                  <a:tcPr/>
-                </a:tc>
-                <a:tc>
-                  <a:txBody>
-                    <a:bodyPr/>
-                    <a:lstStyle/>
-                    <a:p>
-                      <a:r>
-                        <a:rPr lang="de-DE" sz="1400" dirty="0" smtClean="0">
-                          <a:solidFill>
-                            <a:schemeClr val="bg1"/>
-                          </a:solidFill>
-                        </a:rPr>
-                        <a:t>Laptop</a:t>
-                      </a:r>
-                      <a:endParaRPr lang="de-DE" sz="1400" b="0" dirty="0">
-                        <a:solidFill>
-                          <a:schemeClr val="bg1"/>
-                        </a:solidFill>
-                      </a:endParaRPr>
-                    </a:p>
-                  </a:txBody>
-                  <a:tcPr/>
-                </a:tc>
-                <a:tc>
-                  <a:txBody>
-                    <a:bodyPr/>
-                    <a:lstStyle/>
-                    <a:p>
-                      <a:r>
-                        <a:rPr lang="de-DE" sz="1400" dirty="0" smtClean="0">
-                          <a:hlinkClick r:id="rId10"/>
-                        </a:rPr>
-                        <a:t>http://www.iconarchive.com/show/refresh-cl-icons-by-tpdkdesign.net/Hardware-Laptop-2-icon.html</a:t>
-                      </a:r>
-                      <a:r>
-                        <a:rPr lang="de-DE" sz="1400" dirty="0" smtClean="0"/>
-                        <a:t> </a:t>
-                      </a:r>
-                      <a:endParaRPr lang="de-DE" sz="1400" b="0" dirty="0"/>
-                    </a:p>
-                  </a:txBody>
-                  <a:tcPr/>
-                </a:tc>
-              </a:tr>
-              <a:tr h="370840">
-                <a:tc>
-                  <a:txBody>
-                    <a:bodyPr/>
-                    <a:lstStyle/>
-                    <a:p>
-                      <a:r>
-                        <a:rPr lang="de-DE" sz="1400" dirty="0" smtClean="0">
-                          <a:solidFill>
-                            <a:schemeClr val="bg1"/>
-                          </a:solidFill>
-                        </a:rPr>
-                        <a:t>[22]</a:t>
-                      </a:r>
-                      <a:endParaRPr lang="de-DE" sz="1400" dirty="0">
-                        <a:solidFill>
-                          <a:schemeClr val="bg1"/>
-                        </a:solidFill>
-                      </a:endParaRPr>
-                    </a:p>
-                  </a:txBody>
-                  <a:tcPr/>
-                </a:tc>
-                <a:tc>
-                  <a:txBody>
-                    <a:bodyPr/>
-                    <a:lstStyle/>
-                    <a:p>
-                      <a:r>
-                        <a:rPr lang="de-DE" sz="1400" dirty="0" smtClean="0">
-                          <a:solidFill>
-                            <a:schemeClr val="bg1"/>
-                          </a:solidFill>
-                        </a:rPr>
-                        <a:t>Ortsschild </a:t>
-                      </a:r>
-                      <a:r>
-                        <a:rPr lang="de-DE" sz="1400" dirty="0" smtClean="0">
-                          <a:solidFill>
-                            <a:schemeClr val="bg1"/>
-                          </a:solidFill>
-                        </a:rPr>
-                        <a:t>W</a:t>
-                      </a:r>
-                      <a:endParaRPr lang="de-DE" sz="1400" dirty="0">
-                        <a:solidFill>
-                          <a:schemeClr val="bg1"/>
-                        </a:solidFill>
-                      </a:endParaRPr>
-                    </a:p>
-                  </a:txBody>
-                  <a:tcPr/>
-                </a:tc>
-                <a:tc>
-                  <a:txBody>
-                    <a:bodyPr/>
-                    <a:lstStyle/>
-                    <a:p>
-                      <a:r>
-                        <a:rPr lang="de-DE" sz="1400" dirty="0" smtClean="0">
-                          <a:hlinkClick r:id="rId2"/>
-                        </a:rPr>
-                        <a:t>http://onlinestreet.de/strassen/ortsschild/Wolfsburg.html</a:t>
-                      </a:r>
-                      <a:r>
-                        <a:rPr lang="de-DE" sz="1400" dirty="0" smtClean="0"/>
-                        <a:t> </a:t>
-                      </a:r>
-                      <a:endParaRPr lang="de-DE" sz="1400" dirty="0"/>
-                    </a:p>
-                  </a:txBody>
-                  <a:tcPr/>
-                </a:tc>
-              </a:tr>
-              <a:tr h="370840">
-                <a:tc>
-                  <a:txBody>
-                    <a:bodyPr/>
-                    <a:lstStyle/>
-                    <a:p>
-                      <a:r>
-                        <a:rPr lang="de-DE" sz="1400" dirty="0" smtClean="0">
-                          <a:solidFill>
-                            <a:schemeClr val="bg1"/>
-                          </a:solidFill>
-                        </a:rPr>
-                        <a:t>[23]</a:t>
-                      </a:r>
-                      <a:endParaRPr lang="de-DE" sz="1400" dirty="0">
-                        <a:solidFill>
-                          <a:schemeClr val="bg1"/>
-                        </a:solidFill>
-                      </a:endParaRPr>
-                    </a:p>
-                  </a:txBody>
-                  <a:tcPr/>
-                </a:tc>
-                <a:tc>
-                  <a:txBody>
-                    <a:bodyPr/>
-                    <a:lstStyle/>
-                    <a:p>
-                      <a:r>
-                        <a:rPr lang="de-DE" sz="1400" dirty="0" smtClean="0">
-                          <a:solidFill>
-                            <a:schemeClr val="bg1"/>
-                          </a:solidFill>
-                        </a:rPr>
-                        <a:t>Gruppe</a:t>
-                      </a:r>
-                      <a:endParaRPr lang="de-DE" sz="1400" dirty="0">
-                        <a:solidFill>
-                          <a:schemeClr val="bg1"/>
-                        </a:solidFill>
-                      </a:endParaRPr>
-                    </a:p>
-                  </a:txBody>
-                  <a:tcPr/>
-                </a:tc>
-                <a:tc>
-                  <a:txBody>
-                    <a:bodyPr/>
-                    <a:lstStyle/>
-                    <a:p>
-                      <a:r>
-                        <a:rPr lang="de-DE" sz="1400" dirty="0" smtClean="0">
-                          <a:hlinkClick r:id="rId11"/>
-                        </a:rPr>
-                        <a:t>http://www.iconarchive.com/show/soft-scraps-icons-by-deleket/User-Group-icon.html</a:t>
                       </a:r>
                       <a:r>
                         <a:rPr lang="de-DE" sz="1400" dirty="0" smtClean="0"/>
@@ -7238,7 +6651,7 @@
         </p:nvGraphicFramePr>
         <p:xfrm>
           <a:off x="323528" y="1125538"/>
-          <a:ext cx="8568952" cy="4815840"/>
+          <a:ext cx="8568952" cy="4749800"/>
         </p:xfrm>
         <a:graphic>
           <a:graphicData uri="http://schemas.openxmlformats.org/drawingml/2006/table">
@@ -7263,7 +6676,7 @@
                             <a:schemeClr val="bg1"/>
                           </a:solidFill>
                         </a:rPr>
-                        <a:t>[24]</a:t>
+                        <a:t>[13]</a:t>
                       </a:r>
                       <a:endParaRPr lang="de-DE" sz="1400" b="0" dirty="0">
                         <a:solidFill>
@@ -7285,7 +6698,7 @@
                             <a:schemeClr val="bg1"/>
                           </a:solidFill>
                         </a:rPr>
-                        <a:t>Taxi</a:t>
+                        <a:t>Ortsschild B</a:t>
                       </a:r>
                       <a:endParaRPr lang="de-DE" sz="1400" b="0" dirty="0">
                         <a:solidFill>
@@ -7305,7 +6718,7 @@
                         <a:rPr lang="de-DE" sz="1400" dirty="0" smtClean="0">
                           <a:hlinkClick r:id="rId2"/>
                         </a:rPr>
-                        <a:t>http://www.iconarchive.com/show/travel-icons-by-aha-soft/taxi-icon.html</a:t>
+                        <a:t>http://onlinestreet.de/strassen/ortsschild/Berlin.Neuk%F6lln.html</a:t>
                       </a:r>
                       <a:r>
                         <a:rPr lang="de-DE" sz="1400" dirty="0" smtClean="0"/>
@@ -7329,15 +6742,7 @@
                             <a:schemeClr val="bg1"/>
                           </a:solidFill>
                         </a:rPr>
-                        <a:t>[</a:t>
-                      </a:r>
-                      <a:r>
-                        <a:rPr lang="de-DE" sz="1400" dirty="0" smtClean="0">
-                          <a:solidFill>
-                            <a:schemeClr val="bg1"/>
-                          </a:solidFill>
-                        </a:rPr>
-                        <a:t>25]</a:t>
+                        <a:t>[14]</a:t>
                       </a:r>
                       <a:endParaRPr lang="de-DE" sz="1400" dirty="0">
                         <a:solidFill>
@@ -7359,7 +6764,7 @@
                             <a:schemeClr val="bg1"/>
                           </a:solidFill>
                         </a:rPr>
-                        <a:t>VW Logo</a:t>
+                        <a:t>Auto</a:t>
                       </a:r>
                       <a:endParaRPr lang="de-DE" sz="1400" dirty="0">
                         <a:solidFill>
@@ -7379,7 +6784,7 @@
                         <a:rPr lang="de-DE" sz="1400" dirty="0" smtClean="0">
                           <a:hlinkClick r:id="rId3"/>
                         </a:rPr>
-                        <a:t>http://media.photobucket.com/image/vw%20button%20icon/caddy-shack/VW%20Emblems%20%20Logos/VW%20Applied%20Emblems/vw-button_icon-3.jpg?o=3</a:t>
+                        <a:t>http://www.iconarchive.com/show/transport-icons-by-icons-land/Car-icon.html</a:t>
                       </a:r>
                       <a:r>
                         <a:rPr lang="de-DE" sz="1400" dirty="0" smtClean="0"/>
@@ -7403,7 +6808,7 @@
                             <a:schemeClr val="bg1"/>
                           </a:solidFill>
                         </a:rPr>
-                        <a:t>[26]</a:t>
+                        <a:t>[15]</a:t>
                       </a:r>
                       <a:endParaRPr lang="de-DE" sz="1400" dirty="0">
                         <a:solidFill>
@@ -7425,7 +6830,411 @@
                             <a:schemeClr val="bg1"/>
                           </a:solidFill>
                         </a:rPr>
-                        <a:t>Stapel</a:t>
+                        <a:t>Bahn Logo</a:t>
+                      </a:r>
+                      <a:endParaRPr lang="de-DE" sz="1400" dirty="0">
+                        <a:solidFill>
+                          <a:schemeClr val="bg1"/>
+                        </a:solidFill>
+                      </a:endParaRPr>
+                    </a:p>
+                  </a:txBody>
+                  <a:tcPr/>
+                </a:tc>
+                <a:tc>
+                  <a:txBody>
+                    <a:bodyPr/>
+                    <a:lstStyle/>
+                    <a:p>
+                      <a:r>
+                        <a:rPr lang="de-DE" sz="1400" dirty="0" smtClean="0">
+                          <a:hlinkClick r:id="rId4"/>
+                        </a:rPr>
+                        <a:t>http://smartphonearea.de/2009/12/appstore-db-navigator-offizielle-bahn-applikation/</a:t>
+                      </a:r>
+                      <a:r>
+                        <a:rPr lang="de-DE" sz="1400" dirty="0" smtClean="0"/>
+                        <a:t> </a:t>
+                      </a:r>
+                      <a:endParaRPr lang="de-DE" sz="1400" dirty="0"/>
+                    </a:p>
+                  </a:txBody>
+                  <a:tcPr/>
+                </a:tc>
+              </a:tr>
+              <a:tr h="370840">
+                <a:tc>
+                  <a:txBody>
+                    <a:bodyPr/>
+                    <a:lstStyle/>
+                    <a:p>
+                      <a:r>
+                        <a:rPr lang="de-DE" sz="1400" dirty="0" smtClean="0">
+                          <a:solidFill>
+                            <a:schemeClr val="bg1"/>
+                          </a:solidFill>
+                        </a:rPr>
+                        <a:t>[16]</a:t>
+                      </a:r>
+                      <a:endParaRPr lang="de-DE" sz="1400" dirty="0">
+                        <a:solidFill>
+                          <a:schemeClr val="bg1"/>
+                        </a:solidFill>
+                      </a:endParaRPr>
+                    </a:p>
+                  </a:txBody>
+                  <a:tcPr/>
+                </a:tc>
+                <a:tc>
+                  <a:txBody>
+                    <a:bodyPr/>
+                    <a:lstStyle/>
+                    <a:p>
+                      <a:r>
+                        <a:rPr lang="de-DE" sz="1400" dirty="0" smtClean="0">
+                          <a:solidFill>
+                            <a:schemeClr val="bg1"/>
+                          </a:solidFill>
+                        </a:rPr>
+                        <a:t>Zug</a:t>
+                      </a:r>
+                      <a:endParaRPr lang="de-DE" sz="1400" dirty="0">
+                        <a:solidFill>
+                          <a:schemeClr val="bg1"/>
+                        </a:solidFill>
+                      </a:endParaRPr>
+                    </a:p>
+                  </a:txBody>
+                  <a:tcPr/>
+                </a:tc>
+                <a:tc>
+                  <a:txBody>
+                    <a:bodyPr/>
+                    <a:lstStyle/>
+                    <a:p>
+                      <a:r>
+                        <a:rPr lang="de-DE" sz="1400" dirty="0" smtClean="0">
+                          <a:hlinkClick r:id="rId5"/>
+                        </a:rPr>
+                        <a:t>http://www.iconarchive.com/show/vista-artistic-icons-by-awicons/2-Hot-Train-icon.html</a:t>
+                      </a:r>
+                      <a:r>
+                        <a:rPr lang="de-DE" sz="1400" dirty="0" smtClean="0"/>
+                        <a:t> </a:t>
+                      </a:r>
+                      <a:endParaRPr lang="de-DE" sz="1400" dirty="0"/>
+                    </a:p>
+                  </a:txBody>
+                  <a:tcPr/>
+                </a:tc>
+              </a:tr>
+              <a:tr h="370840">
+                <a:tc>
+                  <a:txBody>
+                    <a:bodyPr/>
+                    <a:lstStyle/>
+                    <a:p>
+                      <a:r>
+                        <a:rPr lang="de-DE" sz="1400" dirty="0" smtClean="0">
+                          <a:solidFill>
+                            <a:schemeClr val="bg1"/>
+                          </a:solidFill>
+                        </a:rPr>
+                        <a:t>[17]</a:t>
+                      </a:r>
+                      <a:endParaRPr lang="de-DE" sz="1400" dirty="0">
+                        <a:solidFill>
+                          <a:schemeClr val="bg1"/>
+                        </a:solidFill>
+                      </a:endParaRPr>
+                    </a:p>
+                  </a:txBody>
+                  <a:tcPr/>
+                </a:tc>
+                <a:tc>
+                  <a:txBody>
+                    <a:bodyPr/>
+                    <a:lstStyle/>
+                    <a:p>
+                      <a:r>
+                        <a:rPr lang="de-DE" sz="1400" dirty="0" smtClean="0">
+                          <a:solidFill>
+                            <a:schemeClr val="bg1"/>
+                          </a:solidFill>
+                        </a:rPr>
+                        <a:t>Bahncard</a:t>
+                      </a:r>
+                      <a:endParaRPr lang="de-DE" sz="1400" dirty="0">
+                        <a:solidFill>
+                          <a:schemeClr val="bg1"/>
+                        </a:solidFill>
+                      </a:endParaRPr>
+                    </a:p>
+                  </a:txBody>
+                  <a:tcPr/>
+                </a:tc>
+                <a:tc>
+                  <a:txBody>
+                    <a:bodyPr/>
+                    <a:lstStyle/>
+                    <a:p>
+                      <a:r>
+                        <a:rPr lang="de-DE" sz="1400" dirty="0" smtClean="0">
+                          <a:hlinkClick r:id="rId6"/>
+                        </a:rPr>
+                        <a:t>http://de.wikipedia.org/w/index.php?title=Datei:Bahncard_100_102009.png&amp;filetimestamp=20101123214027</a:t>
+                      </a:r>
+                      <a:r>
+                        <a:rPr lang="de-DE" sz="1400" dirty="0" smtClean="0"/>
+                        <a:t> </a:t>
+                      </a:r>
+                      <a:endParaRPr lang="de-DE" sz="1400" dirty="0"/>
+                    </a:p>
+                  </a:txBody>
+                  <a:tcPr/>
+                </a:tc>
+              </a:tr>
+              <a:tr h="370840">
+                <a:tc>
+                  <a:txBody>
+                    <a:bodyPr/>
+                    <a:lstStyle/>
+                    <a:p>
+                      <a:r>
+                        <a:rPr lang="de-DE" sz="1400" dirty="0" smtClean="0">
+                          <a:solidFill>
+                            <a:schemeClr val="bg1"/>
+                          </a:solidFill>
+                        </a:rPr>
+                        <a:t>[18]</a:t>
+                      </a:r>
+                      <a:endParaRPr lang="de-DE" sz="1400" dirty="0">
+                        <a:solidFill>
+                          <a:schemeClr val="bg1"/>
+                        </a:solidFill>
+                      </a:endParaRPr>
+                    </a:p>
+                  </a:txBody>
+                  <a:tcPr/>
+                </a:tc>
+                <a:tc>
+                  <a:txBody>
+                    <a:bodyPr/>
+                    <a:lstStyle/>
+                    <a:p>
+                      <a:r>
+                        <a:rPr lang="de-DE" sz="1400" dirty="0" smtClean="0">
+                          <a:solidFill>
+                            <a:schemeClr val="bg1"/>
+                          </a:solidFill>
+                        </a:rPr>
+                        <a:t>Ticket X</a:t>
+                      </a:r>
+                      <a:endParaRPr lang="de-DE" sz="1400" dirty="0">
+                        <a:solidFill>
+                          <a:schemeClr val="bg1"/>
+                        </a:solidFill>
+                      </a:endParaRPr>
+                    </a:p>
+                  </a:txBody>
+                  <a:tcPr/>
+                </a:tc>
+                <a:tc>
+                  <a:txBody>
+                    <a:bodyPr/>
+                    <a:lstStyle/>
+                    <a:p>
+                      <a:r>
+                        <a:rPr lang="de-DE" sz="1400" dirty="0" smtClean="0">
+                          <a:hlinkClick r:id="rId7"/>
+                        </a:rPr>
+                        <a:t>http://www.iconarchive.com/show/pretty-office-3-icons-by-custom-icon-design/remove-ticket-icon.html</a:t>
+                      </a:r>
+                      <a:r>
+                        <a:rPr lang="de-DE" sz="1400" dirty="0" smtClean="0"/>
+                        <a:t> </a:t>
+                      </a:r>
+                      <a:endParaRPr lang="de-DE" sz="1400" dirty="0"/>
+                    </a:p>
+                  </a:txBody>
+                  <a:tcPr/>
+                </a:tc>
+              </a:tr>
+              <a:tr h="370840">
+                <a:tc>
+                  <a:txBody>
+                    <a:bodyPr/>
+                    <a:lstStyle/>
+                    <a:p>
+                      <a:r>
+                        <a:rPr lang="de-DE" sz="1400" dirty="0" smtClean="0">
+                          <a:solidFill>
+                            <a:schemeClr val="bg1"/>
+                          </a:solidFill>
+                        </a:rPr>
+                        <a:t>[19]</a:t>
+                      </a:r>
+                      <a:endParaRPr lang="de-DE" sz="1400" dirty="0">
+                        <a:solidFill>
+                          <a:schemeClr val="bg1"/>
+                        </a:solidFill>
+                      </a:endParaRPr>
+                    </a:p>
+                  </a:txBody>
+                  <a:tcPr/>
+                </a:tc>
+                <a:tc>
+                  <a:txBody>
+                    <a:bodyPr/>
+                    <a:lstStyle/>
+                    <a:p>
+                      <a:r>
+                        <a:rPr lang="de-DE" sz="1400" dirty="0" err="1" smtClean="0">
+                          <a:solidFill>
+                            <a:schemeClr val="bg1"/>
+                          </a:solidFill>
+                        </a:rPr>
+                        <a:t>Fragezeich</a:t>
+                      </a:r>
+                      <a:r>
+                        <a:rPr lang="de-DE" sz="1400" dirty="0" smtClean="0">
+                          <a:solidFill>
+                            <a:schemeClr val="bg1"/>
+                          </a:solidFill>
+                        </a:rPr>
+                        <a:t>.</a:t>
+                      </a:r>
+                      <a:endParaRPr lang="de-DE" sz="1400" dirty="0">
+                        <a:solidFill>
+                          <a:schemeClr val="bg1"/>
+                        </a:solidFill>
+                      </a:endParaRPr>
+                    </a:p>
+                  </a:txBody>
+                  <a:tcPr/>
+                </a:tc>
+                <a:tc>
+                  <a:txBody>
+                    <a:bodyPr/>
+                    <a:lstStyle/>
+                    <a:p>
+                      <a:r>
+                        <a:rPr lang="de-DE" sz="1400" dirty="0" smtClean="0">
+                          <a:hlinkClick r:id="rId8"/>
+                        </a:rPr>
+                        <a:t>http://www.iconarchive.com/show/3d-cartoon-vol2-icons-by-deleket/Help-And-Support-icon.html</a:t>
+                      </a:r>
+                      <a:r>
+                        <a:rPr lang="de-DE" sz="1400" dirty="0" smtClean="0"/>
+                        <a:t> </a:t>
+                      </a:r>
+                      <a:endParaRPr lang="de-DE" sz="1400" dirty="0"/>
+                    </a:p>
+                  </a:txBody>
+                  <a:tcPr/>
+                </a:tc>
+              </a:tr>
+              <a:tr h="370840">
+                <a:tc>
+                  <a:txBody>
+                    <a:bodyPr/>
+                    <a:lstStyle/>
+                    <a:p>
+                      <a:r>
+                        <a:rPr lang="de-DE" sz="1400" dirty="0" smtClean="0">
+                          <a:solidFill>
+                            <a:schemeClr val="bg1"/>
+                          </a:solidFill>
+                        </a:rPr>
+                        <a:t>[20]</a:t>
+                      </a:r>
+                      <a:endParaRPr lang="de-DE" sz="1400" dirty="0">
+                        <a:solidFill>
+                          <a:schemeClr val="bg1"/>
+                        </a:solidFill>
+                      </a:endParaRPr>
+                    </a:p>
+                  </a:txBody>
+                  <a:tcPr/>
+                </a:tc>
+                <a:tc>
+                  <a:txBody>
+                    <a:bodyPr/>
+                    <a:lstStyle/>
+                    <a:p>
+                      <a:r>
+                        <a:rPr lang="de-DE" sz="1400" dirty="0" err="1" smtClean="0">
+                          <a:solidFill>
+                            <a:schemeClr val="bg1"/>
+                          </a:solidFill>
+                        </a:rPr>
+                        <a:t>Frownie</a:t>
+                      </a:r>
+                      <a:endParaRPr lang="de-DE" sz="1400" dirty="0">
+                        <a:solidFill>
+                          <a:schemeClr val="bg1"/>
+                        </a:solidFill>
+                      </a:endParaRPr>
+                    </a:p>
+                  </a:txBody>
+                  <a:tcPr/>
+                </a:tc>
+                <a:tc>
+                  <a:txBody>
+                    <a:bodyPr/>
+                    <a:lstStyle/>
+                    <a:p>
+                      <a:r>
+                        <a:rPr lang="de-DE" sz="1400" dirty="0" smtClean="0">
+                          <a:hlinkClick r:id="rId9"/>
+                        </a:rPr>
+                        <a:t>http://www.iconarchive.com/show/keriyo-emoticons-icons-by-deleket/Smiley-upset-3-icon.html</a:t>
+                      </a:r>
+                      <a:r>
+                        <a:rPr lang="de-DE" sz="1400" dirty="0" smtClean="0"/>
+                        <a:t> </a:t>
+                      </a:r>
+                      <a:endParaRPr lang="de-DE" sz="1400" dirty="0"/>
+                    </a:p>
+                  </a:txBody>
+                  <a:tcPr/>
+                </a:tc>
+              </a:tr>
+              <a:tr h="370840">
+                <a:tc>
+                  <a:txBody>
+                    <a:bodyPr/>
+                    <a:lstStyle/>
+                    <a:p>
+                      <a:r>
+                        <a:rPr lang="de-DE" sz="1400" dirty="0" smtClean="0">
+                          <a:solidFill>
+                            <a:schemeClr val="bg1"/>
+                          </a:solidFill>
+                        </a:rPr>
+                        <a:t>[21]</a:t>
+                      </a:r>
+                      <a:endParaRPr lang="de-DE" sz="1400" dirty="0">
+                        <a:solidFill>
+                          <a:schemeClr val="bg1"/>
+                        </a:solidFill>
+                      </a:endParaRPr>
+                    </a:p>
+                  </a:txBody>
+                  <a:tcPr/>
+                </a:tc>
+                <a:tc>
+                  <a:txBody>
+                    <a:bodyPr/>
+                    <a:lstStyle/>
+                    <a:p>
+                      <a:r>
+                        <a:rPr lang="de-DE" sz="1400" dirty="0" smtClean="0">
+                          <a:solidFill>
+                            <a:schemeClr val="bg1"/>
+                          </a:solidFill>
+                        </a:rPr>
+                        <a:t>Laptop</a:t>
                       </a:r>
                       <a:endParaRPr lang="de-DE" sz="1400" b="0" dirty="0">
                         <a:solidFill>
@@ -7443,9 +7252,9 @@
                     <a:p>
                       <a:r>
                         <a:rPr lang="de-DE" sz="1400" dirty="0" smtClean="0">
-                          <a:hlinkClick r:id="rId4"/>
-                        </a:rPr>
-                        <a:t>http://www.iconarchive.com/show/recycling-icons-by-skuzigraphic/paper-icon.html</a:t>
+                          <a:hlinkClick r:id="rId10"/>
+                        </a:rPr>
+                        <a:t>http://www.iconarchive.com/show/refresh-cl-icons-by-tpdkdesign.net/Hardware-Laptop-2-icon.html</a:t>
                       </a:r>
                       <a:r>
                         <a:rPr lang="de-DE" sz="1400" dirty="0" smtClean="0"/>
@@ -7469,7 +7278,7 @@
                             <a:schemeClr val="bg1"/>
                           </a:solidFill>
                         </a:rPr>
-                        <a:t>[27]</a:t>
+                        <a:t>[22]</a:t>
                       </a:r>
                       <a:endParaRPr lang="de-DE" sz="1400" dirty="0">
                         <a:solidFill>
@@ -7491,51 +7300,7 @@
                             <a:schemeClr val="bg1"/>
                           </a:solidFill>
                         </a:rPr>
-                        <a:t>X</a:t>
-                      </a:r>
-                      <a:endParaRPr lang="de-DE" sz="1400" b="0" dirty="0">
-                        <a:solidFill>
-                          <a:schemeClr val="bg1"/>
-                        </a:solidFill>
-                      </a:endParaRPr>
-                    </a:p>
-                  </a:txBody>
-                  <a:tcPr/>
-                </a:tc>
-                <a:tc>
-                  <a:txBody>
-                    <a:bodyPr/>
-                    <a:lstStyle/>
-                    <a:p>
-                      <a:r>
-                        <a:rPr lang="de-DE" sz="1400" dirty="0" smtClean="0">
-                          <a:hlinkClick r:id="rId5"/>
-                        </a:rPr>
-                        <a:t>http://www.iconarchive.com/show/farm-fresh-icons-by-fatcow/cross-icon.html</a:t>
-                      </a:r>
-                      <a:r>
-                        <a:rPr lang="de-DE" sz="1400" dirty="0" smtClean="0"/>
-                        <a:t> </a:t>
-                      </a:r>
-                      <a:endParaRPr lang="de-DE" sz="1400" b="0" dirty="0"/>
-                    </a:p>
-                  </a:txBody>
-                  <a:tcPr/>
-                </a:tc>
-              </a:tr>
-              <a:tr h="370840">
-                <a:tc>
-                  <a:txBody>
-                    <a:bodyPr/>
-                    <a:lstStyle/>
-                    <a:p>
-                      <a:r>
-                        <a:rPr lang="de-DE" sz="1400" dirty="0" smtClean="0">
-                          <a:solidFill>
-                            <a:schemeClr val="bg1"/>
-                          </a:solidFill>
-                        </a:rPr>
-                        <a:t>[28]</a:t>
+                        <a:t>Ortsschild W</a:t>
                       </a:r>
                       <a:endParaRPr lang="de-DE" sz="1400" dirty="0">
                         <a:solidFill>
@@ -7553,37 +7318,15 @@
                     <a:p>
                       <a:r>
                         <a:rPr lang="de-DE" sz="1400" dirty="0" smtClean="0">
-                          <a:solidFill>
-                            <a:schemeClr val="bg1"/>
-                          </a:solidFill>
-                        </a:rPr>
-                        <a:t>Handy</a:t>
-                      </a:r>
-                      <a:endParaRPr lang="de-DE" sz="1400" b="0" dirty="0">
-                        <a:solidFill>
-                          <a:schemeClr val="bg1"/>
-                        </a:solidFill>
-                      </a:endParaRPr>
-                    </a:p>
-                  </a:txBody>
-                  <a:tcPr/>
-                </a:tc>
-                <a:tc>
-                  <a:txBody>
-                    <a:bodyPr/>
-                    <a:lstStyle/>
-                    <a:p>
-                      <a:r>
-                        <a:rPr lang="de-DE" sz="1400" dirty="0" smtClean="0">
-                          <a:hlinkClick r:id="rId6"/>
-                        </a:rPr>
-                        <a:t>http://www.iconarchive.com/show/real-vista-mobile-icons-by-iconshock/blackberry-icon.html</a:t>
+                          <a:hlinkClick r:id="rId2"/>
+                        </a:rPr>
+                        <a:t>http://onlinestreet.de/strassen/ortsschild/Wolfsburg.html</a:t>
                       </a:r>
                       <a:r>
                         <a:rPr lang="de-DE" sz="1400" dirty="0" smtClean="0"/>
                         <a:t> </a:t>
                       </a:r>
-                      <a:endParaRPr lang="de-DE" sz="1400" b="0" dirty="0"/>
+                      <a:endParaRPr lang="de-DE" sz="1400" dirty="0"/>
                     </a:p>
                   </a:txBody>
                   <a:tcPr/>
@@ -7601,7 +7344,7 @@
                             <a:schemeClr val="bg1"/>
                           </a:solidFill>
                         </a:rPr>
-                        <a:t>[29]</a:t>
+                        <a:t>[23]</a:t>
                       </a:r>
                       <a:endParaRPr lang="de-DE" sz="1400" dirty="0">
                         <a:solidFill>
@@ -7623,51 +7366,7 @@
                             <a:schemeClr val="bg1"/>
                           </a:solidFill>
                         </a:rPr>
-                        <a:t>Ticket Grün</a:t>
-                      </a:r>
-                      <a:endParaRPr lang="de-DE" sz="1400" b="0" dirty="0">
-                        <a:solidFill>
-                          <a:schemeClr val="bg1"/>
-                        </a:solidFill>
-                      </a:endParaRPr>
-                    </a:p>
-                  </a:txBody>
-                  <a:tcPr/>
-                </a:tc>
-                <a:tc>
-                  <a:txBody>
-                    <a:bodyPr/>
-                    <a:lstStyle/>
-                    <a:p>
-                      <a:r>
-                        <a:rPr lang="de-DE" sz="1400" dirty="0" smtClean="0">
-                          <a:hlinkClick r:id="rId7"/>
-                        </a:rPr>
-                        <a:t>http://www.iconarchive.com/show/pretty-office-3-icons-by-custom-icon-design/ticket-1-icon.html</a:t>
-                      </a:r>
-                      <a:r>
-                        <a:rPr lang="de-DE" sz="1400" dirty="0" smtClean="0"/>
-                        <a:t> </a:t>
-                      </a:r>
-                      <a:endParaRPr lang="de-DE" sz="1400" b="0" dirty="0"/>
-                    </a:p>
-                  </a:txBody>
-                  <a:tcPr/>
-                </a:tc>
-              </a:tr>
-              <a:tr h="370840">
-                <a:tc>
-                  <a:txBody>
-                    <a:bodyPr/>
-                    <a:lstStyle/>
-                    <a:p>
-                      <a:r>
-                        <a:rPr lang="de-DE" sz="1400" dirty="0" smtClean="0">
-                          <a:solidFill>
-                            <a:schemeClr val="bg1"/>
-                          </a:solidFill>
-                        </a:rPr>
-                        <a:t>[30]</a:t>
+                        <a:t>Gruppe</a:t>
                       </a:r>
                       <a:endParaRPr lang="de-DE" sz="1400" dirty="0">
                         <a:solidFill>
@@ -7685,309 +7384,15 @@
                     <a:p>
                       <a:r>
                         <a:rPr lang="de-DE" sz="1400" dirty="0" smtClean="0">
-                          <a:solidFill>
-                            <a:schemeClr val="bg1"/>
-                          </a:solidFill>
-                        </a:rPr>
-                        <a:t>Blasen</a:t>
-                      </a:r>
-                      <a:endParaRPr lang="de-DE" sz="1400" b="0" dirty="0">
-                        <a:solidFill>
-                          <a:schemeClr val="bg1"/>
-                        </a:solidFill>
-                      </a:endParaRPr>
-                    </a:p>
-                  </a:txBody>
-                  <a:tcPr/>
-                </a:tc>
-                <a:tc>
-                  <a:txBody>
-                    <a:bodyPr/>
-                    <a:lstStyle/>
-                    <a:p>
-                      <a:r>
-                        <a:rPr lang="de-DE" sz="1400" dirty="0" smtClean="0">
-                          <a:hlinkClick r:id="rId8"/>
-                        </a:rPr>
-                        <a:t>http://www.iconarchive.com/show/pretty-office-6-icons-by-custom-icon-design/communication-icon.html</a:t>
+                          <a:hlinkClick r:id="rId11"/>
+                        </a:rPr>
+                        <a:t>http://www.iconarchive.com/show/soft-scraps-icons-by-deleket/User-Group-icon.html</a:t>
                       </a:r>
                       <a:r>
                         <a:rPr lang="de-DE" sz="1400" dirty="0" smtClean="0"/>
                         <a:t> </a:t>
                       </a:r>
-                      <a:endParaRPr lang="de-DE" sz="1400" b="0" dirty="0"/>
-                    </a:p>
-                  </a:txBody>
-                  <a:tcPr/>
-                </a:tc>
-              </a:tr>
-              <a:tr h="370840">
-                <a:tc>
-                  <a:txBody>
-                    <a:bodyPr/>
-                    <a:lstStyle/>
-                    <a:p>
-                      <a:r>
-                        <a:rPr lang="de-DE" sz="1400" dirty="0" smtClean="0">
-                          <a:solidFill>
-                            <a:schemeClr val="bg1"/>
-                          </a:solidFill>
-                        </a:rPr>
-                        <a:t>[31]</a:t>
-                      </a:r>
-                      <a:endParaRPr lang="de-DE" sz="1400" dirty="0">
-                        <a:solidFill>
-                          <a:schemeClr val="bg1"/>
-                        </a:solidFill>
-                      </a:endParaRPr>
-                    </a:p>
-                  </a:txBody>
-                  <a:tcPr/>
-                </a:tc>
-                <a:tc>
-                  <a:txBody>
-                    <a:bodyPr/>
-                    <a:lstStyle/>
-                    <a:p>
-                      <a:r>
-                        <a:rPr lang="de-DE" sz="1400" dirty="0" smtClean="0">
-                          <a:solidFill>
-                            <a:schemeClr val="bg1"/>
-                          </a:solidFill>
-                        </a:rPr>
-                        <a:t>Karte</a:t>
-                      </a:r>
-                      <a:endParaRPr lang="de-DE" sz="1400" dirty="0">
-                        <a:solidFill>
-                          <a:schemeClr val="bg1"/>
-                        </a:solidFill>
-                      </a:endParaRPr>
-                    </a:p>
-                  </a:txBody>
-                  <a:tcPr/>
-                </a:tc>
-                <a:tc>
-                  <a:txBody>
-                    <a:bodyPr/>
-                    <a:lstStyle/>
-                    <a:p>
-                      <a:r>
-                        <a:rPr lang="de-DE" sz="1400" dirty="0" smtClean="0">
-                          <a:hlinkClick r:id="rId9"/>
-                        </a:rPr>
-                        <a:t>http://www.iconarchive.com/show/palm-icons-by-thiago-silva/Google-Maps-icon.html</a:t>
-                      </a:r>
-                      <a:r>
-                        <a:rPr lang="de-DE" sz="1400" dirty="0" smtClean="0"/>
-                        <a:t> </a:t>
-                      </a:r>
                       <a:endParaRPr lang="de-DE" sz="1400" dirty="0"/>
-                    </a:p>
-                  </a:txBody>
-                  <a:tcPr/>
-                </a:tc>
-              </a:tr>
-              <a:tr h="370840">
-                <a:tc>
-                  <a:txBody>
-                    <a:bodyPr/>
-                    <a:lstStyle/>
-                    <a:p>
-                      <a:r>
-                        <a:rPr lang="de-DE" sz="1400" dirty="0" smtClean="0">
-                          <a:solidFill>
-                            <a:schemeClr val="bg1"/>
-                          </a:solidFill>
-                        </a:rPr>
-                        <a:t>[32]</a:t>
-                      </a:r>
-                      <a:endParaRPr lang="de-DE" sz="1400" dirty="0">
-                        <a:solidFill>
-                          <a:schemeClr val="bg1"/>
-                        </a:solidFill>
-                      </a:endParaRPr>
-                    </a:p>
-                  </a:txBody>
-                  <a:tcPr/>
-                </a:tc>
-                <a:tc>
-                  <a:txBody>
-                    <a:bodyPr/>
-                    <a:lstStyle/>
-                    <a:p>
-                      <a:r>
-                        <a:rPr lang="de-DE" sz="1400" dirty="0" smtClean="0">
-                          <a:solidFill>
-                            <a:schemeClr val="bg1"/>
-                          </a:solidFill>
-                        </a:rPr>
-                        <a:t>Sozial 1</a:t>
-                      </a:r>
-                      <a:endParaRPr lang="de-DE" sz="1400" b="0" dirty="0">
-                        <a:solidFill>
-                          <a:schemeClr val="bg1"/>
-                        </a:solidFill>
-                      </a:endParaRPr>
-                    </a:p>
-                  </a:txBody>
-                  <a:tcPr/>
-                </a:tc>
-                <a:tc>
-                  <a:txBody>
-                    <a:bodyPr/>
-                    <a:lstStyle/>
-                    <a:p>
-                      <a:r>
-                        <a:rPr lang="de-DE" sz="1400" dirty="0" smtClean="0">
-                          <a:hlinkClick r:id="rId10"/>
-                        </a:rPr>
-                        <a:t>http://www.iconarchive.com/show/soft-scraps-icons-by-deleket/User-Chat-icon.html</a:t>
-                      </a:r>
-                      <a:r>
-                        <a:rPr lang="de-DE" sz="1400" dirty="0" smtClean="0"/>
-                        <a:t> </a:t>
-                      </a:r>
-                      <a:endParaRPr lang="de-DE" sz="1400" b="0" dirty="0"/>
-                    </a:p>
-                  </a:txBody>
-                  <a:tcPr/>
-                </a:tc>
-              </a:tr>
-              <a:tr h="370840">
-                <a:tc>
-                  <a:txBody>
-                    <a:bodyPr/>
-                    <a:lstStyle/>
-                    <a:p>
-                      <a:r>
-                        <a:rPr lang="de-DE" sz="1400" dirty="0" smtClean="0">
-                          <a:solidFill>
-                            <a:schemeClr val="bg1"/>
-                          </a:solidFill>
-                        </a:rPr>
-                        <a:t>[33]</a:t>
-                      </a:r>
-                      <a:endParaRPr lang="de-DE" sz="1400" dirty="0">
-                        <a:solidFill>
-                          <a:schemeClr val="bg1"/>
-                        </a:solidFill>
-                      </a:endParaRPr>
-                    </a:p>
-                  </a:txBody>
-                  <a:tcPr/>
-                </a:tc>
-                <a:tc>
-                  <a:txBody>
-                    <a:bodyPr/>
-                    <a:lstStyle/>
-                    <a:p>
-                      <a:r>
-                        <a:rPr lang="de-DE" sz="1400" dirty="0" smtClean="0">
-                          <a:solidFill>
-                            <a:schemeClr val="bg1"/>
-                          </a:solidFill>
-                        </a:rPr>
-                        <a:t>Sozial</a:t>
-                      </a:r>
-                      <a:r>
-                        <a:rPr lang="de-DE" sz="1400" baseline="0" dirty="0" smtClean="0">
-                          <a:solidFill>
-                            <a:schemeClr val="bg1"/>
-                          </a:solidFill>
-                        </a:rPr>
-                        <a:t> 2</a:t>
-                      </a:r>
-                      <a:endParaRPr lang="de-DE" sz="1400" b="0" dirty="0">
-                        <a:solidFill>
-                          <a:schemeClr val="bg1"/>
-                        </a:solidFill>
-                      </a:endParaRPr>
-                    </a:p>
-                  </a:txBody>
-                  <a:tcPr/>
-                </a:tc>
-                <a:tc>
-                  <a:txBody>
-                    <a:bodyPr/>
-                    <a:lstStyle/>
-                    <a:p>
-                      <a:r>
-                        <a:rPr lang="de-DE" sz="1400" dirty="0" smtClean="0">
-                          <a:hlinkClick r:id="rId11"/>
-                        </a:rPr>
-                        <a:t>http://www.iconarchive.com/show/sleek-xp-basic-icons-by-deleket/Chat-icon.html</a:t>
-                      </a:r>
-                      <a:r>
-                        <a:rPr lang="de-DE" sz="1400" dirty="0" smtClean="0"/>
-                        <a:t> </a:t>
-                      </a:r>
-                      <a:endParaRPr lang="de-DE" sz="1400" b="0" dirty="0"/>
-                    </a:p>
-                  </a:txBody>
-                  <a:tcPr/>
-                </a:tc>
-              </a:tr>
-              <a:tr h="370840">
-                <a:tc>
-                  <a:txBody>
-                    <a:bodyPr/>
-                    <a:lstStyle/>
-                    <a:p>
-                      <a:r>
-                        <a:rPr lang="de-DE" sz="1400" dirty="0" smtClean="0">
-                          <a:solidFill>
-                            <a:schemeClr val="bg1"/>
-                          </a:solidFill>
-                        </a:rPr>
-                        <a:t>[34]</a:t>
-                      </a:r>
-                      <a:endParaRPr lang="de-DE" sz="1400" dirty="0">
-                        <a:solidFill>
-                          <a:schemeClr val="bg1"/>
-                        </a:solidFill>
-                      </a:endParaRPr>
-                    </a:p>
-                  </a:txBody>
-                  <a:tcPr/>
-                </a:tc>
-                <a:tc>
-                  <a:txBody>
-                    <a:bodyPr/>
-                    <a:lstStyle/>
-                    <a:p>
-                      <a:r>
-                        <a:rPr lang="de-DE" sz="1400" dirty="0" smtClean="0">
-                          <a:solidFill>
-                            <a:schemeClr val="bg1"/>
-                          </a:solidFill>
-                        </a:rPr>
-                        <a:t>Router</a:t>
-                      </a:r>
-                      <a:endParaRPr lang="de-DE" sz="1400" b="0" dirty="0">
-                        <a:solidFill>
-                          <a:schemeClr val="bg1"/>
-                        </a:solidFill>
-                      </a:endParaRPr>
-                    </a:p>
-                  </a:txBody>
-                  <a:tcPr/>
-                </a:tc>
-                <a:tc>
-                  <a:txBody>
-                    <a:bodyPr/>
-                    <a:lstStyle/>
-                    <a:p>
-                      <a:r>
-                        <a:rPr lang="de-DE" sz="1400" dirty="0" smtClean="0">
-                          <a:hlinkClick r:id="rId12"/>
-                        </a:rPr>
-                        <a:t>http://www.iconarchive.com/show/junior-icons-by-treetog/network-icon.html</a:t>
-                      </a:r>
-                      <a:r>
-                        <a:rPr lang="de-DE" sz="1400" dirty="0" smtClean="0"/>
-                        <a:t> </a:t>
-                      </a:r>
-                      <a:endParaRPr lang="de-DE" sz="1400" b="0" dirty="0"/>
                     </a:p>
                   </a:txBody>
                   <a:tcPr/>
@@ -8134,6 +7539,894 @@
         </p:nvGraphicFramePr>
         <p:xfrm>
           <a:off x="323528" y="1125538"/>
+          <a:ext cx="8568952" cy="4815840"/>
+        </p:xfrm>
+        <a:graphic>
+          <a:graphicData uri="http://schemas.openxmlformats.org/drawingml/2006/table">
+            <a:tbl>
+              <a:tblPr firstRow="1" bandRow="1">
+                <a:tableStyleId>{2D5ABB26-0587-4C30-8999-92F81FD0307C}</a:tableStyleId>
+              </a:tblPr>
+              <a:tblGrid>
+                <a:gridCol w="504056"/>
+                <a:gridCol w="1152128"/>
+                <a:gridCol w="6912768"/>
+              </a:tblGrid>
+              <a:tr h="287238">
+                <a:tc>
+                  <a:txBody>
+                    <a:bodyPr/>
+                    <a:lstStyle/>
+                    <a:p>
+                      <a:r>
+                        <a:rPr lang="de-DE" sz="1400" dirty="0" smtClean="0">
+                          <a:solidFill>
+                            <a:schemeClr val="bg1"/>
+                          </a:solidFill>
+                        </a:rPr>
+                        <a:t>[24]</a:t>
+                      </a:r>
+                      <a:endParaRPr lang="de-DE" sz="1400" b="0" dirty="0">
+                        <a:solidFill>
+                          <a:schemeClr val="bg1"/>
+                        </a:solidFill>
+                      </a:endParaRPr>
+                    </a:p>
+                  </a:txBody>
+                  <a:tcPr/>
+                </a:tc>
+                <a:tc>
+                  <a:txBody>
+                    <a:bodyPr/>
+                    <a:lstStyle/>
+                    <a:p>
+                      <a:r>
+                        <a:rPr lang="de-DE" sz="1400" dirty="0" smtClean="0">
+                          <a:solidFill>
+                            <a:schemeClr val="bg1"/>
+                          </a:solidFill>
+                        </a:rPr>
+                        <a:t>Taxi</a:t>
+                      </a:r>
+                      <a:endParaRPr lang="de-DE" sz="1400" b="0" dirty="0">
+                        <a:solidFill>
+                          <a:schemeClr val="bg1"/>
+                        </a:solidFill>
+                      </a:endParaRPr>
+                    </a:p>
+                  </a:txBody>
+                  <a:tcPr/>
+                </a:tc>
+                <a:tc>
+                  <a:txBody>
+                    <a:bodyPr/>
+                    <a:lstStyle/>
+                    <a:p>
+                      <a:r>
+                        <a:rPr lang="de-DE" sz="1400" dirty="0" smtClean="0">
+                          <a:hlinkClick r:id="rId2"/>
+                        </a:rPr>
+                        <a:t>http://www.iconarchive.com/show/travel-icons-by-aha-soft/taxi-icon.html</a:t>
+                      </a:r>
+                      <a:r>
+                        <a:rPr lang="de-DE" sz="1400" dirty="0" smtClean="0"/>
+                        <a:t> </a:t>
+                      </a:r>
+                      <a:endParaRPr lang="de-DE" sz="1400" b="0" dirty="0"/>
+                    </a:p>
+                  </a:txBody>
+                  <a:tcPr/>
+                </a:tc>
+              </a:tr>
+              <a:tr h="370840">
+                <a:tc>
+                  <a:txBody>
+                    <a:bodyPr/>
+                    <a:lstStyle/>
+                    <a:p>
+                      <a:r>
+                        <a:rPr lang="de-DE" sz="1400" dirty="0" smtClean="0">
+                          <a:solidFill>
+                            <a:schemeClr val="bg1"/>
+                          </a:solidFill>
+                        </a:rPr>
+                        <a:t>[25]</a:t>
+                      </a:r>
+                      <a:endParaRPr lang="de-DE" sz="1400" dirty="0">
+                        <a:solidFill>
+                          <a:schemeClr val="bg1"/>
+                        </a:solidFill>
+                      </a:endParaRPr>
+                    </a:p>
+                  </a:txBody>
+                  <a:tcPr/>
+                </a:tc>
+                <a:tc>
+                  <a:txBody>
+                    <a:bodyPr/>
+                    <a:lstStyle/>
+                    <a:p>
+                      <a:r>
+                        <a:rPr lang="de-DE" sz="1400" dirty="0" smtClean="0">
+                          <a:solidFill>
+                            <a:schemeClr val="bg1"/>
+                          </a:solidFill>
+                        </a:rPr>
+                        <a:t>VW Logo</a:t>
+                      </a:r>
+                      <a:endParaRPr lang="de-DE" sz="1400" dirty="0">
+                        <a:solidFill>
+                          <a:schemeClr val="bg1"/>
+                        </a:solidFill>
+                      </a:endParaRPr>
+                    </a:p>
+                  </a:txBody>
+                  <a:tcPr/>
+                </a:tc>
+                <a:tc>
+                  <a:txBody>
+                    <a:bodyPr/>
+                    <a:lstStyle/>
+                    <a:p>
+                      <a:r>
+                        <a:rPr lang="de-DE" sz="1400" dirty="0" smtClean="0">
+                          <a:hlinkClick r:id="rId3"/>
+                        </a:rPr>
+                        <a:t>http://media.photobucket.com/image/vw%20button%20icon/caddy-shack/VW%20Emblems%20%20Logos/VW%20Applied%20Emblems/vw-button_icon-3.jpg?o=3</a:t>
+                      </a:r>
+                      <a:r>
+                        <a:rPr lang="de-DE" sz="1400" dirty="0" smtClean="0"/>
+                        <a:t> </a:t>
+                      </a:r>
+                      <a:endParaRPr lang="de-DE" sz="1400" dirty="0"/>
+                    </a:p>
+                  </a:txBody>
+                  <a:tcPr/>
+                </a:tc>
+              </a:tr>
+              <a:tr h="370840">
+                <a:tc>
+                  <a:txBody>
+                    <a:bodyPr/>
+                    <a:lstStyle/>
+                    <a:p>
+                      <a:r>
+                        <a:rPr lang="de-DE" sz="1400" dirty="0" smtClean="0">
+                          <a:solidFill>
+                            <a:schemeClr val="bg1"/>
+                          </a:solidFill>
+                        </a:rPr>
+                        <a:t>[26]</a:t>
+                      </a:r>
+                      <a:endParaRPr lang="de-DE" sz="1400" dirty="0">
+                        <a:solidFill>
+                          <a:schemeClr val="bg1"/>
+                        </a:solidFill>
+                      </a:endParaRPr>
+                    </a:p>
+                  </a:txBody>
+                  <a:tcPr/>
+                </a:tc>
+                <a:tc>
+                  <a:txBody>
+                    <a:bodyPr/>
+                    <a:lstStyle/>
+                    <a:p>
+                      <a:r>
+                        <a:rPr lang="de-DE" sz="1400" dirty="0" smtClean="0">
+                          <a:solidFill>
+                            <a:schemeClr val="bg1"/>
+                          </a:solidFill>
+                        </a:rPr>
+                        <a:t>Stapel</a:t>
+                      </a:r>
+                      <a:endParaRPr lang="de-DE" sz="1400" b="0" dirty="0">
+                        <a:solidFill>
+                          <a:schemeClr val="bg1"/>
+                        </a:solidFill>
+                      </a:endParaRPr>
+                    </a:p>
+                  </a:txBody>
+                  <a:tcPr/>
+                </a:tc>
+                <a:tc>
+                  <a:txBody>
+                    <a:bodyPr/>
+                    <a:lstStyle/>
+                    <a:p>
+                      <a:r>
+                        <a:rPr lang="de-DE" sz="1400" dirty="0" smtClean="0">
+                          <a:hlinkClick r:id="rId4"/>
+                        </a:rPr>
+                        <a:t>http://www.iconarchive.com/show/recycling-icons-by-skuzigraphic/paper-icon.html</a:t>
+                      </a:r>
+                      <a:r>
+                        <a:rPr lang="de-DE" sz="1400" dirty="0" smtClean="0"/>
+                        <a:t> </a:t>
+                      </a:r>
+                      <a:endParaRPr lang="de-DE" sz="1400" b="0" dirty="0"/>
+                    </a:p>
+                  </a:txBody>
+                  <a:tcPr/>
+                </a:tc>
+              </a:tr>
+              <a:tr h="370840">
+                <a:tc>
+                  <a:txBody>
+                    <a:bodyPr/>
+                    <a:lstStyle/>
+                    <a:p>
+                      <a:r>
+                        <a:rPr lang="de-DE" sz="1400" dirty="0" smtClean="0">
+                          <a:solidFill>
+                            <a:schemeClr val="bg1"/>
+                          </a:solidFill>
+                        </a:rPr>
+                        <a:t>[27]</a:t>
+                      </a:r>
+                      <a:endParaRPr lang="de-DE" sz="1400" dirty="0">
+                        <a:solidFill>
+                          <a:schemeClr val="bg1"/>
+                        </a:solidFill>
+                      </a:endParaRPr>
+                    </a:p>
+                  </a:txBody>
+                  <a:tcPr/>
+                </a:tc>
+                <a:tc>
+                  <a:txBody>
+                    <a:bodyPr/>
+                    <a:lstStyle/>
+                    <a:p>
+                      <a:r>
+                        <a:rPr lang="de-DE" sz="1400" dirty="0" smtClean="0">
+                          <a:solidFill>
+                            <a:schemeClr val="bg1"/>
+                          </a:solidFill>
+                        </a:rPr>
+                        <a:t>X</a:t>
+                      </a:r>
+                      <a:endParaRPr lang="de-DE" sz="1400" b="0" dirty="0">
+                        <a:solidFill>
+                          <a:schemeClr val="bg1"/>
+                        </a:solidFill>
+                      </a:endParaRPr>
+                    </a:p>
+                  </a:txBody>
+                  <a:tcPr/>
+                </a:tc>
+                <a:tc>
+                  <a:txBody>
+                    <a:bodyPr/>
+                    <a:lstStyle/>
+                    <a:p>
+                      <a:r>
+                        <a:rPr lang="de-DE" sz="1400" dirty="0" smtClean="0">
+                          <a:hlinkClick r:id="rId5"/>
+                        </a:rPr>
+                        <a:t>http://www.iconarchive.com/show/farm-fresh-icons-by-fatcow/cross-icon.html</a:t>
+                      </a:r>
+                      <a:r>
+                        <a:rPr lang="de-DE" sz="1400" dirty="0" smtClean="0"/>
+                        <a:t> </a:t>
+                      </a:r>
+                      <a:endParaRPr lang="de-DE" sz="1400" b="0" dirty="0"/>
+                    </a:p>
+                  </a:txBody>
+                  <a:tcPr/>
+                </a:tc>
+              </a:tr>
+              <a:tr h="370840">
+                <a:tc>
+                  <a:txBody>
+                    <a:bodyPr/>
+                    <a:lstStyle/>
+                    <a:p>
+                      <a:r>
+                        <a:rPr lang="de-DE" sz="1400" dirty="0" smtClean="0">
+                          <a:solidFill>
+                            <a:schemeClr val="bg1"/>
+                          </a:solidFill>
+                        </a:rPr>
+                        <a:t>[28]</a:t>
+                      </a:r>
+                      <a:endParaRPr lang="de-DE" sz="1400" dirty="0">
+                        <a:solidFill>
+                          <a:schemeClr val="bg1"/>
+                        </a:solidFill>
+                      </a:endParaRPr>
+                    </a:p>
+                  </a:txBody>
+                  <a:tcPr/>
+                </a:tc>
+                <a:tc>
+                  <a:txBody>
+                    <a:bodyPr/>
+                    <a:lstStyle/>
+                    <a:p>
+                      <a:r>
+                        <a:rPr lang="de-DE" sz="1400" dirty="0" smtClean="0">
+                          <a:solidFill>
+                            <a:schemeClr val="bg1"/>
+                          </a:solidFill>
+                        </a:rPr>
+                        <a:t>Handy</a:t>
+                      </a:r>
+                      <a:endParaRPr lang="de-DE" sz="1400" b="0" dirty="0">
+                        <a:solidFill>
+                          <a:schemeClr val="bg1"/>
+                        </a:solidFill>
+                      </a:endParaRPr>
+                    </a:p>
+                  </a:txBody>
+                  <a:tcPr/>
+                </a:tc>
+                <a:tc>
+                  <a:txBody>
+                    <a:bodyPr/>
+                    <a:lstStyle/>
+                    <a:p>
+                      <a:r>
+                        <a:rPr lang="de-DE" sz="1400" dirty="0" smtClean="0">
+                          <a:hlinkClick r:id="rId6"/>
+                        </a:rPr>
+                        <a:t>http://www.iconarchive.com/show/real-vista-mobile-icons-by-iconshock/blackberry-icon.html</a:t>
+                      </a:r>
+                      <a:r>
+                        <a:rPr lang="de-DE" sz="1400" dirty="0" smtClean="0"/>
+                        <a:t> </a:t>
+                      </a:r>
+                      <a:endParaRPr lang="de-DE" sz="1400" b="0" dirty="0"/>
+                    </a:p>
+                  </a:txBody>
+                  <a:tcPr/>
+                </a:tc>
+              </a:tr>
+              <a:tr h="370840">
+                <a:tc>
+                  <a:txBody>
+                    <a:bodyPr/>
+                    <a:lstStyle/>
+                    <a:p>
+                      <a:r>
+                        <a:rPr lang="de-DE" sz="1400" dirty="0" smtClean="0">
+                          <a:solidFill>
+                            <a:schemeClr val="bg1"/>
+                          </a:solidFill>
+                        </a:rPr>
+                        <a:t>[29]</a:t>
+                      </a:r>
+                      <a:endParaRPr lang="de-DE" sz="1400" dirty="0">
+                        <a:solidFill>
+                          <a:schemeClr val="bg1"/>
+                        </a:solidFill>
+                      </a:endParaRPr>
+                    </a:p>
+                  </a:txBody>
+                  <a:tcPr/>
+                </a:tc>
+                <a:tc>
+                  <a:txBody>
+                    <a:bodyPr/>
+                    <a:lstStyle/>
+                    <a:p>
+                      <a:r>
+                        <a:rPr lang="de-DE" sz="1400" dirty="0" smtClean="0">
+                          <a:solidFill>
+                            <a:schemeClr val="bg1"/>
+                          </a:solidFill>
+                        </a:rPr>
+                        <a:t>Ticket Grün</a:t>
+                      </a:r>
+                      <a:endParaRPr lang="de-DE" sz="1400" b="0" dirty="0">
+                        <a:solidFill>
+                          <a:schemeClr val="bg1"/>
+                        </a:solidFill>
+                      </a:endParaRPr>
+                    </a:p>
+                  </a:txBody>
+                  <a:tcPr/>
+                </a:tc>
+                <a:tc>
+                  <a:txBody>
+                    <a:bodyPr/>
+                    <a:lstStyle/>
+                    <a:p>
+                      <a:r>
+                        <a:rPr lang="de-DE" sz="1400" dirty="0" smtClean="0">
+                          <a:hlinkClick r:id="rId7"/>
+                        </a:rPr>
+                        <a:t>http://www.iconarchive.com/show/pretty-office-3-icons-by-custom-icon-design/ticket-1-icon.html</a:t>
+                      </a:r>
+                      <a:r>
+                        <a:rPr lang="de-DE" sz="1400" dirty="0" smtClean="0"/>
+                        <a:t> </a:t>
+                      </a:r>
+                      <a:endParaRPr lang="de-DE" sz="1400" b="0" dirty="0"/>
+                    </a:p>
+                  </a:txBody>
+                  <a:tcPr/>
+                </a:tc>
+              </a:tr>
+              <a:tr h="370840">
+                <a:tc>
+                  <a:txBody>
+                    <a:bodyPr/>
+                    <a:lstStyle/>
+                    <a:p>
+                      <a:r>
+                        <a:rPr lang="de-DE" sz="1400" dirty="0" smtClean="0">
+                          <a:solidFill>
+                            <a:schemeClr val="bg1"/>
+                          </a:solidFill>
+                        </a:rPr>
+                        <a:t>[30]</a:t>
+                      </a:r>
+                      <a:endParaRPr lang="de-DE" sz="1400" dirty="0">
+                        <a:solidFill>
+                          <a:schemeClr val="bg1"/>
+                        </a:solidFill>
+                      </a:endParaRPr>
+                    </a:p>
+                  </a:txBody>
+                  <a:tcPr/>
+                </a:tc>
+                <a:tc>
+                  <a:txBody>
+                    <a:bodyPr/>
+                    <a:lstStyle/>
+                    <a:p>
+                      <a:r>
+                        <a:rPr lang="de-DE" sz="1400" dirty="0" smtClean="0">
+                          <a:solidFill>
+                            <a:schemeClr val="bg1"/>
+                          </a:solidFill>
+                        </a:rPr>
+                        <a:t>Blasen</a:t>
+                      </a:r>
+                      <a:endParaRPr lang="de-DE" sz="1400" b="0" dirty="0">
+                        <a:solidFill>
+                          <a:schemeClr val="bg1"/>
+                        </a:solidFill>
+                      </a:endParaRPr>
+                    </a:p>
+                  </a:txBody>
+                  <a:tcPr/>
+                </a:tc>
+                <a:tc>
+                  <a:txBody>
+                    <a:bodyPr/>
+                    <a:lstStyle/>
+                    <a:p>
+                      <a:r>
+                        <a:rPr lang="de-DE" sz="1400" dirty="0" smtClean="0">
+                          <a:hlinkClick r:id="rId8"/>
+                        </a:rPr>
+                        <a:t>http://www.iconarchive.com/show/pretty-office-6-icons-by-custom-icon-design/communication-icon.html</a:t>
+                      </a:r>
+                      <a:r>
+                        <a:rPr lang="de-DE" sz="1400" dirty="0" smtClean="0"/>
+                        <a:t> </a:t>
+                      </a:r>
+                      <a:endParaRPr lang="de-DE" sz="1400" b="0" dirty="0"/>
+                    </a:p>
+                  </a:txBody>
+                  <a:tcPr/>
+                </a:tc>
+              </a:tr>
+              <a:tr h="370840">
+                <a:tc>
+                  <a:txBody>
+                    <a:bodyPr/>
+                    <a:lstStyle/>
+                    <a:p>
+                      <a:r>
+                        <a:rPr lang="de-DE" sz="1400" dirty="0" smtClean="0">
+                          <a:solidFill>
+                            <a:schemeClr val="bg1"/>
+                          </a:solidFill>
+                        </a:rPr>
+                        <a:t>[31]</a:t>
+                      </a:r>
+                      <a:endParaRPr lang="de-DE" sz="1400" dirty="0">
+                        <a:solidFill>
+                          <a:schemeClr val="bg1"/>
+                        </a:solidFill>
+                      </a:endParaRPr>
+                    </a:p>
+                  </a:txBody>
+                  <a:tcPr/>
+                </a:tc>
+                <a:tc>
+                  <a:txBody>
+                    <a:bodyPr/>
+                    <a:lstStyle/>
+                    <a:p>
+                      <a:r>
+                        <a:rPr lang="de-DE" sz="1400" dirty="0" smtClean="0">
+                          <a:solidFill>
+                            <a:schemeClr val="bg1"/>
+                          </a:solidFill>
+                        </a:rPr>
+                        <a:t>Karte</a:t>
+                      </a:r>
+                      <a:endParaRPr lang="de-DE" sz="1400" dirty="0">
+                        <a:solidFill>
+                          <a:schemeClr val="bg1"/>
+                        </a:solidFill>
+                      </a:endParaRPr>
+                    </a:p>
+                  </a:txBody>
+                  <a:tcPr/>
+                </a:tc>
+                <a:tc>
+                  <a:txBody>
+                    <a:bodyPr/>
+                    <a:lstStyle/>
+                    <a:p>
+                      <a:r>
+                        <a:rPr lang="de-DE" sz="1400" dirty="0" smtClean="0">
+                          <a:hlinkClick r:id="rId9"/>
+                        </a:rPr>
+                        <a:t>http://www.iconarchive.com/show/palm-icons-by-thiago-silva/Google-Maps-icon.html</a:t>
+                      </a:r>
+                      <a:r>
+                        <a:rPr lang="de-DE" sz="1400" dirty="0" smtClean="0"/>
+                        <a:t> </a:t>
+                      </a:r>
+                      <a:endParaRPr lang="de-DE" sz="1400" dirty="0"/>
+                    </a:p>
+                  </a:txBody>
+                  <a:tcPr/>
+                </a:tc>
+              </a:tr>
+              <a:tr h="370840">
+                <a:tc>
+                  <a:txBody>
+                    <a:bodyPr/>
+                    <a:lstStyle/>
+                    <a:p>
+                      <a:r>
+                        <a:rPr lang="de-DE" sz="1400" dirty="0" smtClean="0">
+                          <a:solidFill>
+                            <a:schemeClr val="bg1"/>
+                          </a:solidFill>
+                        </a:rPr>
+                        <a:t>[32]</a:t>
+                      </a:r>
+                      <a:endParaRPr lang="de-DE" sz="1400" dirty="0">
+                        <a:solidFill>
+                          <a:schemeClr val="bg1"/>
+                        </a:solidFill>
+                      </a:endParaRPr>
+                    </a:p>
+                  </a:txBody>
+                  <a:tcPr/>
+                </a:tc>
+                <a:tc>
+                  <a:txBody>
+                    <a:bodyPr/>
+                    <a:lstStyle/>
+                    <a:p>
+                      <a:r>
+                        <a:rPr lang="de-DE" sz="1400" dirty="0" smtClean="0">
+                          <a:solidFill>
+                            <a:schemeClr val="bg1"/>
+                          </a:solidFill>
+                        </a:rPr>
+                        <a:t>Sozial 1</a:t>
+                      </a:r>
+                      <a:endParaRPr lang="de-DE" sz="1400" b="0" dirty="0">
+                        <a:solidFill>
+                          <a:schemeClr val="bg1"/>
+                        </a:solidFill>
+                      </a:endParaRPr>
+                    </a:p>
+                  </a:txBody>
+                  <a:tcPr/>
+                </a:tc>
+                <a:tc>
+                  <a:txBody>
+                    <a:bodyPr/>
+                    <a:lstStyle/>
+                    <a:p>
+                      <a:r>
+                        <a:rPr lang="de-DE" sz="1400" dirty="0" smtClean="0">
+                          <a:hlinkClick r:id="rId10"/>
+                        </a:rPr>
+                        <a:t>http://www.iconarchive.com/show/soft-scraps-icons-by-deleket/User-Chat-icon.html</a:t>
+                      </a:r>
+                      <a:r>
+                        <a:rPr lang="de-DE" sz="1400" dirty="0" smtClean="0"/>
+                        <a:t> </a:t>
+                      </a:r>
+                      <a:endParaRPr lang="de-DE" sz="1400" b="0" dirty="0"/>
+                    </a:p>
+                  </a:txBody>
+                  <a:tcPr/>
+                </a:tc>
+              </a:tr>
+              <a:tr h="370840">
+                <a:tc>
+                  <a:txBody>
+                    <a:bodyPr/>
+                    <a:lstStyle/>
+                    <a:p>
+                      <a:r>
+                        <a:rPr lang="de-DE" sz="1400" dirty="0" smtClean="0">
+                          <a:solidFill>
+                            <a:schemeClr val="bg1"/>
+                          </a:solidFill>
+                        </a:rPr>
+                        <a:t>[33]</a:t>
+                      </a:r>
+                      <a:endParaRPr lang="de-DE" sz="1400" dirty="0">
+                        <a:solidFill>
+                          <a:schemeClr val="bg1"/>
+                        </a:solidFill>
+                      </a:endParaRPr>
+                    </a:p>
+                  </a:txBody>
+                  <a:tcPr/>
+                </a:tc>
+                <a:tc>
+                  <a:txBody>
+                    <a:bodyPr/>
+                    <a:lstStyle/>
+                    <a:p>
+                      <a:r>
+                        <a:rPr lang="de-DE" sz="1400" dirty="0" smtClean="0">
+                          <a:solidFill>
+                            <a:schemeClr val="bg1"/>
+                          </a:solidFill>
+                        </a:rPr>
+                        <a:t>Sozial</a:t>
+                      </a:r>
+                      <a:r>
+                        <a:rPr lang="de-DE" sz="1400" baseline="0" dirty="0" smtClean="0">
+                          <a:solidFill>
+                            <a:schemeClr val="bg1"/>
+                          </a:solidFill>
+                        </a:rPr>
+                        <a:t> 2</a:t>
+                      </a:r>
+                      <a:endParaRPr lang="de-DE" sz="1400" b="0" dirty="0">
+                        <a:solidFill>
+                          <a:schemeClr val="bg1"/>
+                        </a:solidFill>
+                      </a:endParaRPr>
+                    </a:p>
+                  </a:txBody>
+                  <a:tcPr/>
+                </a:tc>
+                <a:tc>
+                  <a:txBody>
+                    <a:bodyPr/>
+                    <a:lstStyle/>
+                    <a:p>
+                      <a:r>
+                        <a:rPr lang="de-DE" sz="1400" dirty="0" smtClean="0">
+                          <a:hlinkClick r:id="rId11"/>
+                        </a:rPr>
+                        <a:t>http://www.iconarchive.com/show/sleek-xp-basic-icons-by-deleket/Chat-icon.html</a:t>
+                      </a:r>
+                      <a:r>
+                        <a:rPr lang="de-DE" sz="1400" dirty="0" smtClean="0"/>
+                        <a:t> </a:t>
+                      </a:r>
+                      <a:endParaRPr lang="de-DE" sz="1400" b="0" dirty="0"/>
+                    </a:p>
+                  </a:txBody>
+                  <a:tcPr/>
+                </a:tc>
+              </a:tr>
+              <a:tr h="370840">
+                <a:tc>
+                  <a:txBody>
+                    <a:bodyPr/>
+                    <a:lstStyle/>
+                    <a:p>
+                      <a:r>
+                        <a:rPr lang="de-DE" sz="1400" dirty="0" smtClean="0">
+                          <a:solidFill>
+                            <a:schemeClr val="bg1"/>
+                          </a:solidFill>
+                        </a:rPr>
+                        <a:t>[34]</a:t>
+                      </a:r>
+                      <a:endParaRPr lang="de-DE" sz="1400" dirty="0">
+                        <a:solidFill>
+                          <a:schemeClr val="bg1"/>
+                        </a:solidFill>
+                      </a:endParaRPr>
+                    </a:p>
+                  </a:txBody>
+                  <a:tcPr/>
+                </a:tc>
+                <a:tc>
+                  <a:txBody>
+                    <a:bodyPr/>
+                    <a:lstStyle/>
+                    <a:p>
+                      <a:r>
+                        <a:rPr lang="de-DE" sz="1400" dirty="0" smtClean="0">
+                          <a:solidFill>
+                            <a:schemeClr val="bg1"/>
+                          </a:solidFill>
+                        </a:rPr>
+                        <a:t>Router</a:t>
+                      </a:r>
+                      <a:endParaRPr lang="de-DE" sz="1400" b="0" dirty="0">
+                        <a:solidFill>
+                          <a:schemeClr val="bg1"/>
+                        </a:solidFill>
+                      </a:endParaRPr>
+                    </a:p>
+                  </a:txBody>
+                  <a:tcPr/>
+                </a:tc>
+                <a:tc>
+                  <a:txBody>
+                    <a:bodyPr/>
+                    <a:lstStyle/>
+                    <a:p>
+                      <a:r>
+                        <a:rPr lang="de-DE" sz="1400" dirty="0" smtClean="0">
+                          <a:hlinkClick r:id="rId12"/>
+                        </a:rPr>
+                        <a:t>http://www.iconarchive.com/show/junior-icons-by-treetog/network-icon.html</a:t>
+                      </a:r>
+                      <a:r>
+                        <a:rPr lang="de-DE" sz="1400" dirty="0" smtClean="0"/>
+                        <a:t> </a:t>
+                      </a:r>
+                      <a:endParaRPr lang="de-DE" sz="1400" b="0" dirty="0"/>
+                    </a:p>
+                  </a:txBody>
+                  <a:tcPr/>
+                </a:tc>
+              </a:tr>
+            </a:tbl>
+          </a:graphicData>
+        </a:graphic>
+      </p:graphicFrame>
+      <p:sp>
+        <p:nvSpPr>
+          <p:cNvPr id="4" name="Datumsplatzhalter 3"/>
+          <p:cNvSpPr>
+            <a:spLocks noGrp="1"/>
+          </p:cNvSpPr>
+          <p:nvPr>
+            <p:ph type="dt" sz="half" idx="10"/>
+          </p:nvPr>
+        </p:nvSpPr>
+        <p:spPr/>
+        <p:txBody>
+          <a:bodyPr/>
+          <a:lstStyle/>
+          <a:p>
+            <a:r>
+              <a:rPr lang="de-DE" smtClean="0"/>
+              <a:t>04.05.2012</a:t>
+            </a:r>
+            <a:endParaRPr lang="de-DE"/>
+          </a:p>
+        </p:txBody>
+      </p:sp>
+      <p:sp>
+        <p:nvSpPr>
+          <p:cNvPr id="5" name="Fußzeilenplatzhalter 4"/>
+          <p:cNvSpPr>
+            <a:spLocks noGrp="1"/>
+          </p:cNvSpPr>
+          <p:nvPr>
+            <p:ph type="ftr" sz="quarter" idx="11"/>
+          </p:nvPr>
+        </p:nvSpPr>
+        <p:spPr/>
+        <p:txBody>
+          <a:bodyPr/>
+          <a:lstStyle/>
+          <a:p>
+            <a:r>
+              <a:rPr lang="de-DE" smtClean="0"/>
+              <a:t>KickOff Präsentation</a:t>
+            </a:r>
+            <a:endParaRPr lang="de-DE"/>
+          </a:p>
+        </p:txBody>
+      </p:sp>
+      <p:sp>
+        <p:nvSpPr>
+          <p:cNvPr id="6" name="Foliennummernplatzhalter 5"/>
+          <p:cNvSpPr>
+            <a:spLocks noGrp="1"/>
+          </p:cNvSpPr>
+          <p:nvPr>
+            <p:ph type="sldNum" sz="quarter" idx="12"/>
+          </p:nvPr>
+        </p:nvSpPr>
+        <p:spPr/>
+        <p:txBody>
+          <a:bodyPr/>
+          <a:lstStyle/>
+          <a:p>
+            <a:fld id="{6C6AE60A-B69C-4790-82F7-3882EDF23186}" type="slidenum">
+              <a:rPr lang="de-DE" smtClean="0"/>
+              <a:pPr/>
+              <a:t>18</a:t>
+            </a:fld>
+            <a:endParaRPr lang="de-DE"/>
+          </a:p>
+        </p:txBody>
+      </p:sp>
+    </p:spTree>
+  </p:cSld>
+  <p:clrMapOvr>
+    <a:masterClrMapping/>
+  </p:clrMapOvr>
+  <p:timing>
+    <p:tnLst>
+      <p:par>
+        <p:cTn id="1" dur="indefinite" restart="never" nodeType="tmRoot"/>
+      </p:par>
+    </p:tnLst>
+  </p:timing>
+</p:sld>
+</file>
+
+<file path=ppt/slides/slide19.xml><?xml version="1.0" encoding="utf-8"?>
+<p:sld xmlns:a="http://schemas.openxmlformats.org/drawingml/2006/main" xmlns:r="http://schemas.openxmlformats.org/officeDocument/2006/relationships" xmlns:p="http://schemas.openxmlformats.org/presentationml/2006/main">
+  <p:cSld>
+    <p:spTree>
+      <p:nvGrpSpPr>
+        <p:cNvPr id="1" name=""/>
+        <p:cNvGrpSpPr/>
+        <p:nvPr/>
+      </p:nvGrpSpPr>
+      <p:grpSpPr>
+        <a:xfrm>
+          <a:off x="0" y="0"/>
+          <a:ext cx="0" cy="0"/>
+          <a:chOff x="0" y="0"/>
+          <a:chExt cx="0" cy="0"/>
+        </a:xfrm>
+      </p:grpSpPr>
+      <p:sp>
+        <p:nvSpPr>
+          <p:cNvPr id="2" name="Titel 1"/>
+          <p:cNvSpPr>
+            <a:spLocks noGrp="1"/>
+          </p:cNvSpPr>
+          <p:nvPr>
+            <p:ph type="title"/>
+          </p:nvPr>
+        </p:nvSpPr>
+        <p:spPr/>
+        <p:txBody>
+          <a:bodyPr/>
+          <a:lstStyle/>
+          <a:p>
+            <a:r>
+              <a:rPr lang="de-DE" dirty="0" smtClean="0"/>
+              <a:t>Quellen</a:t>
+            </a:r>
+            <a:endParaRPr lang="de-DE" dirty="0"/>
+          </a:p>
+        </p:txBody>
+      </p:sp>
+      <p:graphicFrame>
+        <p:nvGraphicFramePr>
+          <p:cNvPr id="7" name="Inhaltsplatzhalter 6"/>
+          <p:cNvGraphicFramePr>
+            <a:graphicFrameLocks noGrp="1"/>
+          </p:cNvGraphicFramePr>
+          <p:nvPr>
+            <p:ph idx="1"/>
+          </p:nvPr>
+        </p:nvGraphicFramePr>
+        <p:xfrm>
+          <a:off x="323528" y="1125538"/>
           <a:ext cx="8568952" cy="4521200"/>
         </p:xfrm>
         <a:graphic>
@@ -8621,15 +8914,7 @@
                             <a:schemeClr val="bg1"/>
                           </a:solidFill>
                         </a:rPr>
-                        <a:t>[</a:t>
-                      </a:r>
-                      <a:r>
-                        <a:rPr lang="de-DE" sz="1400" dirty="0" smtClean="0">
-                          <a:solidFill>
-                            <a:schemeClr val="bg1"/>
-                          </a:solidFill>
-                        </a:rPr>
-                        <a:t>42]</a:t>
+                        <a:t>[42]</a:t>
                       </a:r>
                       <a:endParaRPr lang="de-DE" sz="1400" dirty="0">
                         <a:solidFill>
@@ -8965,7 +9250,7 @@
             <a:fld id="{6C6AE60A-B69C-4790-82F7-3882EDF23186}" type="slidenum">
               <a:rPr lang="de-DE" smtClean="0"/>
               <a:pPr/>
-              <a:t>18</a:t>
+              <a:t>19</a:t>
             </a:fld>
             <a:endParaRPr lang="de-DE"/>
           </a:p>
@@ -9067,7 +9352,11 @@
             </a:pPr>
             <a:r>
               <a:rPr lang="de-DE" dirty="0" smtClean="0"/>
-              <a:t>Lösungsansatz 2</a:t>
+              <a:t>Lösungsansatz </a:t>
+            </a:r>
+            <a:r>
+              <a:rPr lang="de-DE" dirty="0" smtClean="0"/>
+              <a:t>2</a:t>
             </a:r>
           </a:p>
           <a:p>
@@ -9077,21 +9366,9 @@
             </a:pPr>
             <a:r>
               <a:rPr lang="de-DE" dirty="0" smtClean="0"/>
-              <a:t>Fragen</a:t>
-            </a:r>
-          </a:p>
-          <a:p>
-            <a:pPr marL="457200" indent="-457200">
-              <a:buFont typeface="+mj-lt"/>
-              <a:buAutoNum type="arabicPeriod"/>
-            </a:pPr>
-            <a:r>
-              <a:rPr lang="de-DE" dirty="0" smtClean="0"/>
-              <a:t>Quellen</a:t>
-            </a:r>
-          </a:p>
-          <a:p>
-            <a:endParaRPr lang="de-DE" dirty="0"/>
+              <a:t>Diskussion</a:t>
+            </a:r>
+            <a:endParaRPr lang="de-DE" dirty="0" smtClean="0"/>
           </a:p>
         </p:txBody>
       </p:sp>
@@ -9322,7 +9599,7 @@
         <p:spPr>
           <a:xfrm>
             <a:off x="6732240" y="5877272"/>
-            <a:ext cx="1912923" cy="523220"/>
+            <a:ext cx="1912923" cy="400110"/>
           </a:xfrm>
           <a:prstGeom prst="rect">
             <a:avLst/>
@@ -9337,7 +9614,7 @@
           <a:p>
             <a:pPr algn="r"/>
             <a:r>
-              <a:rPr lang="de-DE" sz="1400" dirty="0" smtClean="0">
+              <a:rPr lang="de-DE" sz="1000" dirty="0" smtClean="0">
                 <a:solidFill>
                   <a:schemeClr val="bg1"/>
                 </a:solidFill>
@@ -9348,22 +9625,14 @@
           <a:p>
             <a:pPr algn="r"/>
             <a:r>
-              <a:rPr lang="de-DE" sz="1400" dirty="0" smtClean="0">
+              <a:rPr lang="de-DE" sz="1000" dirty="0" smtClean="0">
                 <a:solidFill>
                   <a:schemeClr val="bg1"/>
                 </a:solidFill>
               </a:rPr>
-              <a:t>[5], [6], [7</a:t>
-            </a:r>
-            <a:r>
-              <a:rPr lang="de-DE" sz="1400" dirty="0" smtClean="0">
-                <a:solidFill>
-                  <a:schemeClr val="bg1"/>
-                </a:solidFill>
-              </a:rPr>
-              <a:t>] 	</a:t>
-            </a:r>
-            <a:endParaRPr lang="de-DE" sz="1400" dirty="0">
+              <a:t>[5], [6], [7] </a:t>
+            </a:r>
+            <a:endParaRPr lang="de-DE" sz="1000" dirty="0">
               <a:solidFill>
                 <a:schemeClr val="bg1"/>
               </a:solidFill>
@@ -9838,7 +10107,9 @@
         </p:nvSpPr>
         <p:spPr/>
         <p:txBody>
-          <a:bodyPr/>
+          <a:bodyPr>
+            <a:normAutofit/>
+          </a:bodyPr>
           <a:lstStyle/>
           <a:p>
             <a:r>
@@ -9852,19 +10123,36 @@
             </a:pPr>
             <a:r>
               <a:rPr lang="de-DE" dirty="0" smtClean="0"/>
-              <a:t>	Eltern aus der Türkei, </a:t>
+              <a:t>	</a:t>
+            </a:r>
+            <a:r>
+              <a:rPr lang="de-DE" dirty="0" smtClean="0"/>
+              <a:t>geboren </a:t>
+            </a:r>
+            <a:r>
+              <a:rPr lang="de-DE" dirty="0" smtClean="0"/>
+              <a:t>in </a:t>
+            </a:r>
+            <a:r>
+              <a:rPr lang="de-DE" dirty="0" smtClean="0"/>
+              <a:t>Dortmund,</a:t>
             </a:r>
             <a:br>
               <a:rPr lang="de-DE" dirty="0" smtClean="0"/>
             </a:br>
             <a:r>
-              <a:rPr lang="de-DE" dirty="0" err="1" smtClean="0"/>
-              <a:t>Batur</a:t>
-            </a:r>
-            <a:r>
               <a:rPr lang="de-DE" dirty="0" smtClean="0"/>
-              <a:t> geboren in Dortmund</a:t>
-            </a:r>
+              <a:t>Eltern </a:t>
+            </a:r>
+            <a:r>
+              <a:rPr lang="de-DE" dirty="0" smtClean="0"/>
+              <a:t>aus der </a:t>
+            </a:r>
+            <a:r>
+              <a:rPr lang="de-DE" dirty="0" smtClean="0"/>
+              <a:t>Türkei</a:t>
+            </a:r>
+            <a:endParaRPr lang="de-DE" dirty="0" smtClean="0"/>
           </a:p>
           <a:p>
             <a:pPr lvl="3">
@@ -10239,7 +10527,7 @@
         <p:spPr>
           <a:xfrm>
             <a:off x="6732240" y="5877272"/>
-            <a:ext cx="1912923" cy="523220"/>
+            <a:ext cx="1912923" cy="400110"/>
           </a:xfrm>
           <a:prstGeom prst="rect">
             <a:avLst/>
@@ -10254,7 +10542,7 @@
           <a:p>
             <a:pPr algn="r"/>
             <a:r>
-              <a:rPr lang="de-DE" sz="1400" dirty="0" smtClean="0">
+              <a:rPr lang="de-DE" sz="1000" dirty="0" smtClean="0">
                 <a:solidFill>
                   <a:schemeClr val="bg1"/>
                 </a:solidFill>
@@ -10262,21 +10550,21 @@
               <a:t>[8], [9], [10]</a:t>
             </a:r>
             <a:br>
-              <a:rPr lang="de-DE" sz="1400" dirty="0" smtClean="0">
+              <a:rPr lang="de-DE" sz="1000" dirty="0" smtClean="0">
                 <a:solidFill>
                   <a:schemeClr val="bg1"/>
                 </a:solidFill>
               </a:rPr>
             </a:br>
             <a:r>
-              <a:rPr lang="de-DE" sz="1400" dirty="0" smtClean="0">
+              <a:rPr lang="de-DE" sz="1000" dirty="0" smtClean="0">
                 <a:solidFill>
                   <a:schemeClr val="bg1"/>
                 </a:solidFill>
               </a:rPr>
               <a:t>[11], [12]</a:t>
             </a:r>
-            <a:endParaRPr lang="de-DE" sz="1400" dirty="0">
+            <a:endParaRPr lang="de-DE" sz="1000" dirty="0">
               <a:solidFill>
                 <a:schemeClr val="bg1"/>
               </a:solidFill>
@@ -11308,7 +11596,7 @@
         <p:spPr>
           <a:xfrm>
             <a:off x="5868144" y="5877272"/>
-            <a:ext cx="2777019" cy="523220"/>
+            <a:ext cx="2777019" cy="400110"/>
           </a:xfrm>
           <a:prstGeom prst="rect">
             <a:avLst/>
@@ -11323,7 +11611,7 @@
           <a:p>
             <a:pPr algn="r"/>
             <a:r>
-              <a:rPr lang="de-DE" sz="1400" dirty="0" smtClean="0">
+              <a:rPr lang="de-DE" sz="1000" dirty="0" smtClean="0">
                 <a:solidFill>
                   <a:schemeClr val="bg1"/>
                 </a:solidFill>
@@ -11331,21 +11619,21 @@
               <a:t>[13], [14], [15], [16], [17], [18], [19],</a:t>
             </a:r>
             <a:br>
-              <a:rPr lang="de-DE" sz="1400" dirty="0" smtClean="0">
+              <a:rPr lang="de-DE" sz="1000" dirty="0" smtClean="0">
                 <a:solidFill>
                   <a:schemeClr val="bg1"/>
                 </a:solidFill>
               </a:rPr>
             </a:br>
             <a:r>
-              <a:rPr lang="de-DE" sz="1400" dirty="0" smtClean="0">
+              <a:rPr lang="de-DE" sz="1000" dirty="0" smtClean="0">
                 <a:solidFill>
                   <a:schemeClr val="bg1"/>
                 </a:solidFill>
               </a:rPr>
               <a:t> [20], [21], [22], [23], [24], [25]</a:t>
             </a:r>
-            <a:endParaRPr lang="de-DE" sz="1400" dirty="0">
+            <a:endParaRPr lang="de-DE" sz="1000" dirty="0">
               <a:solidFill>
                 <a:schemeClr val="bg1"/>
               </a:solidFill>
@@ -11772,7 +12060,7 @@
         <p:spPr>
           <a:xfrm>
             <a:off x="6732240" y="5877272"/>
-            <a:ext cx="1912923" cy="523220"/>
+            <a:ext cx="1912923" cy="400110"/>
           </a:xfrm>
           <a:prstGeom prst="rect">
             <a:avLst/>
@@ -11787,7 +12075,7 @@
           <a:p>
             <a:pPr algn="r"/>
             <a:r>
-              <a:rPr lang="de-DE" sz="1400" dirty="0" smtClean="0">
+              <a:rPr lang="de-DE" sz="1000" dirty="0" smtClean="0">
                 <a:solidFill>
                   <a:schemeClr val="bg1"/>
                 </a:solidFill>
@@ -11795,21 +12083,21 @@
               <a:t>[26], [27], [28], [29],</a:t>
             </a:r>
             <a:br>
-              <a:rPr lang="de-DE" sz="1400" dirty="0" smtClean="0">
+              <a:rPr lang="de-DE" sz="1000" dirty="0" smtClean="0">
                 <a:solidFill>
                   <a:schemeClr val="bg1"/>
                 </a:solidFill>
               </a:rPr>
             </a:br>
             <a:r>
-              <a:rPr lang="de-DE" sz="1400" dirty="0" smtClean="0">
+              <a:rPr lang="de-DE" sz="1000" dirty="0" smtClean="0">
                 <a:solidFill>
                   <a:schemeClr val="bg1"/>
                 </a:solidFill>
               </a:rPr>
               <a:t>[30], [31], [32], [33]</a:t>
             </a:r>
-            <a:endParaRPr lang="de-DE" sz="1400" dirty="0">
+            <a:endParaRPr lang="de-DE" sz="1000" dirty="0">
               <a:solidFill>
                 <a:schemeClr val="bg1"/>
               </a:solidFill>
@@ -11902,7 +12190,11 @@
               <a:buAutoNum type="arabicPeriod"/>
             </a:pPr>
             <a:r>
-              <a:rPr lang="de-DE" dirty="0" smtClean="0"/>
+              <a:rPr lang="de-DE" dirty="0" smtClean="0">
+                <a:solidFill>
+                  <a:srgbClr val="FF0000"/>
+                </a:solidFill>
+              </a:rPr>
               <a:t>Lösungsansatz 1</a:t>
             </a:r>
           </a:p>
@@ -11913,7 +12205,11 @@
             </a:pPr>
             <a:r>
               <a:rPr lang="de-DE" dirty="0" smtClean="0"/>
-              <a:t>Lösungsansatz 2</a:t>
+              <a:t>Lösungsansatz </a:t>
+            </a:r>
+            <a:r>
+              <a:rPr lang="de-DE" dirty="0" smtClean="0"/>
+              <a:t>2</a:t>
             </a:r>
           </a:p>
           <a:p>
@@ -11923,18 +12219,9 @@
             </a:pPr>
             <a:r>
               <a:rPr lang="de-DE" dirty="0" smtClean="0"/>
-              <a:t>Fragen</a:t>
-            </a:r>
-          </a:p>
-          <a:p>
-            <a:pPr marL="457200" indent="-457200">
-              <a:buFont typeface="+mj-lt"/>
-              <a:buAutoNum type="arabicPeriod"/>
-            </a:pPr>
-            <a:r>
-              <a:rPr lang="de-DE" dirty="0" smtClean="0"/>
-              <a:t>Quellen</a:t>
-            </a:r>
+              <a:t>Diskussion</a:t>
+            </a:r>
+            <a:endParaRPr lang="de-DE" dirty="0" smtClean="0"/>
           </a:p>
           <a:p>
             <a:endParaRPr lang="de-DE" dirty="0"/>
@@ -12725,7 +13012,7 @@
         <p:spPr>
           <a:xfrm>
             <a:off x="6732240" y="5877272"/>
-            <a:ext cx="1912923" cy="523220"/>
+            <a:ext cx="1912923" cy="400110"/>
           </a:xfrm>
           <a:prstGeom prst="rect">
             <a:avLst/>
@@ -12740,7 +13027,7 @@
           <a:p>
             <a:pPr algn="r"/>
             <a:r>
-              <a:rPr lang="de-DE" sz="1400" dirty="0" smtClean="0">
+              <a:rPr lang="de-DE" sz="1000" dirty="0" smtClean="0">
                 <a:solidFill>
                   <a:schemeClr val="bg1"/>
                 </a:solidFill>
@@ -12748,21 +13035,21 @@
               <a:t>[3], [16], [24,] [28],</a:t>
             </a:r>
             <a:br>
-              <a:rPr lang="de-DE" sz="1400" dirty="0" smtClean="0">
+              <a:rPr lang="de-DE" sz="1000" dirty="0" smtClean="0">
                 <a:solidFill>
                   <a:schemeClr val="bg1"/>
                 </a:solidFill>
               </a:rPr>
             </a:br>
             <a:r>
-              <a:rPr lang="de-DE" sz="1400" dirty="0" smtClean="0">
+              <a:rPr lang="de-DE" sz="1000" dirty="0" smtClean="0">
                 <a:solidFill>
                   <a:schemeClr val="bg1"/>
                 </a:solidFill>
               </a:rPr>
               <a:t>[34], [35], [36], [37]  </a:t>
             </a:r>
-            <a:endParaRPr lang="de-DE" sz="1400" dirty="0">
+            <a:endParaRPr lang="de-DE" sz="1000" dirty="0">
               <a:solidFill>
                 <a:schemeClr val="bg1"/>
               </a:solidFill>

</xml_diff>